<commit_message>
Small tweaks to PPT
</commit_message>
<xml_diff>
--- a/Presentations/Open Repositories 2016/Digital Stewardship/DigitalStewardship.pptx
+++ b/Presentations/Open Repositories 2016/Digital Stewardship/DigitalStewardship.pptx
@@ -5,12 +5,16 @@
     <p:sldMasterId id="2147483660" r:id="rId1"/>
   </p:sldMasterIdLst>
   <p:notesMasterIdLst>
-    <p:notesMasterId r:id="rId5"/>
+    <p:notesMasterId r:id="rId9"/>
   </p:notesMasterIdLst>
   <p:sldIdLst>
     <p:sldId id="257" r:id="rId2"/>
-    <p:sldId id="258" r:id="rId3"/>
-    <p:sldId id="265" r:id="rId4"/>
+    <p:sldId id="269" r:id="rId3"/>
+    <p:sldId id="270" r:id="rId4"/>
+    <p:sldId id="268" r:id="rId5"/>
+    <p:sldId id="266" r:id="rId6"/>
+    <p:sldId id="265" r:id="rId7"/>
+    <p:sldId id="258" r:id="rId8"/>
   </p:sldIdLst>
   <p:sldSz cx="9144000" cy="6858000" type="screen4x3"/>
   <p:notesSz cx="6858000" cy="9144000"/>
@@ -210,7 +214,7 @@
           <a:p>
             <a:fld id="{D9ECFEF1-2E88-E646-A99D-93EC0DB2D22C}" type="datetimeFigureOut">
               <a:rPr lang="en-US" smtClean="0"/>
-              <a:t>6/1/16</a:t>
+              <a:t>6/6/16</a:t>
             </a:fld>
             <a:endParaRPr lang="en-US"/>
           </a:p>
@@ -635,7 +639,7 @@
           <a:p>
             <a:fld id="{F0D14C87-DF6A-634A-AD3D-CAB6EA4C158C}" type="slidenum">
               <a:rPr lang="en-US" smtClean="0"/>
-              <a:t>3</a:t>
+              <a:t>6</a:t>
             </a:fld>
             <a:endParaRPr lang="en-US"/>
           </a:p>
@@ -835,7 +839,7 @@
           <a:p>
             <a:fld id="{C952E0D9-C4C6-B144-92E9-4E0D31DDAA26}" type="datetimeFigureOut">
               <a:rPr lang="en-US" smtClean="0"/>
-              <a:t>6/1/16</a:t>
+              <a:t>6/6/16</a:t>
             </a:fld>
             <a:endParaRPr lang="en-US"/>
           </a:p>
@@ -1005,7 +1009,7 @@
           <a:p>
             <a:fld id="{C952E0D9-C4C6-B144-92E9-4E0D31DDAA26}" type="datetimeFigureOut">
               <a:rPr lang="en-US" smtClean="0"/>
-              <a:t>6/1/16</a:t>
+              <a:t>6/6/16</a:t>
             </a:fld>
             <a:endParaRPr lang="en-US"/>
           </a:p>
@@ -1185,7 +1189,7 @@
           <a:p>
             <a:fld id="{C952E0D9-C4C6-B144-92E9-4E0D31DDAA26}" type="datetimeFigureOut">
               <a:rPr lang="en-US" smtClean="0"/>
-              <a:t>6/1/16</a:t>
+              <a:t>6/6/16</a:t>
             </a:fld>
             <a:endParaRPr lang="en-US"/>
           </a:p>
@@ -1355,7 +1359,7 @@
           <a:p>
             <a:fld id="{C952E0D9-C4C6-B144-92E9-4E0D31DDAA26}" type="datetimeFigureOut">
               <a:rPr lang="en-US" smtClean="0"/>
-              <a:t>6/1/16</a:t>
+              <a:t>6/6/16</a:t>
             </a:fld>
             <a:endParaRPr lang="en-US"/>
           </a:p>
@@ -1601,7 +1605,7 @@
           <a:p>
             <a:fld id="{C952E0D9-C4C6-B144-92E9-4E0D31DDAA26}" type="datetimeFigureOut">
               <a:rPr lang="en-US" smtClean="0"/>
-              <a:t>6/1/16</a:t>
+              <a:t>6/6/16</a:t>
             </a:fld>
             <a:endParaRPr lang="en-US"/>
           </a:p>
@@ -1889,7 +1893,7 @@
           <a:p>
             <a:fld id="{C952E0D9-C4C6-B144-92E9-4E0D31DDAA26}" type="datetimeFigureOut">
               <a:rPr lang="en-US" smtClean="0"/>
-              <a:t>6/1/16</a:t>
+              <a:t>6/6/16</a:t>
             </a:fld>
             <a:endParaRPr lang="en-US"/>
           </a:p>
@@ -2311,7 +2315,7 @@
           <a:p>
             <a:fld id="{C952E0D9-C4C6-B144-92E9-4E0D31DDAA26}" type="datetimeFigureOut">
               <a:rPr lang="en-US" smtClean="0"/>
-              <a:t>6/1/16</a:t>
+              <a:t>6/6/16</a:t>
             </a:fld>
             <a:endParaRPr lang="en-US"/>
           </a:p>
@@ -2429,7 +2433,7 @@
           <a:p>
             <a:fld id="{C952E0D9-C4C6-B144-92E9-4E0D31DDAA26}" type="datetimeFigureOut">
               <a:rPr lang="en-US" smtClean="0"/>
-              <a:t>6/1/16</a:t>
+              <a:t>6/6/16</a:t>
             </a:fld>
             <a:endParaRPr lang="en-US"/>
           </a:p>
@@ -2524,7 +2528,7 @@
           <a:p>
             <a:fld id="{C952E0D9-C4C6-B144-92E9-4E0D31DDAA26}" type="datetimeFigureOut">
               <a:rPr lang="en-US" smtClean="0"/>
-              <a:t>6/1/16</a:t>
+              <a:t>6/6/16</a:t>
             </a:fld>
             <a:endParaRPr lang="en-US"/>
           </a:p>
@@ -2801,7 +2805,7 @@
           <a:p>
             <a:fld id="{C952E0D9-C4C6-B144-92E9-4E0D31DDAA26}" type="datetimeFigureOut">
               <a:rPr lang="en-US" smtClean="0"/>
-              <a:t>6/1/16</a:t>
+              <a:t>6/6/16</a:t>
             </a:fld>
             <a:endParaRPr lang="en-US"/>
           </a:p>
@@ -3058,7 +3062,7 @@
           <a:p>
             <a:fld id="{C952E0D9-C4C6-B144-92E9-4E0D31DDAA26}" type="datetimeFigureOut">
               <a:rPr lang="en-US" smtClean="0"/>
-              <a:t>6/1/16</a:t>
+              <a:t>6/6/16</a:t>
             </a:fld>
             <a:endParaRPr lang="en-US"/>
           </a:p>
@@ -3274,7 +3278,7 @@
           <a:p>
             <a:fld id="{C952E0D9-C4C6-B144-92E9-4E0D31DDAA26}" type="datetimeFigureOut">
               <a:rPr lang="en-US" smtClean="0"/>
-              <a:t>6/1/16</a:t>
+              <a:t>6/6/16</a:t>
             </a:fld>
             <a:endParaRPr lang="en-US"/>
           </a:p>
@@ -3842,6 +3846,54 @@
           </a:p>
         </p:txBody>
       </p:sp>
+      <p:sp>
+        <p:nvSpPr>
+          <p:cNvPr id="2" name="Title 1"/>
+          <p:cNvSpPr>
+            <a:spLocks noGrp="1"/>
+          </p:cNvSpPr>
+          <p:nvPr>
+            <p:ph type="ctrTitle"/>
+          </p:nvPr>
+        </p:nvSpPr>
+        <p:spPr>
+          <a:xfrm>
+            <a:off x="685800" y="1254125"/>
+            <a:ext cx="7772400" cy="1470025"/>
+          </a:xfrm>
+        </p:spPr>
+        <p:txBody>
+          <a:bodyPr/>
+          <a:lstStyle/>
+          <a:p>
+            <a:endParaRPr lang="en-US"/>
+          </a:p>
+        </p:txBody>
+      </p:sp>
+      <p:sp>
+        <p:nvSpPr>
+          <p:cNvPr id="3" name="Subtitle 2"/>
+          <p:cNvSpPr>
+            <a:spLocks noGrp="1"/>
+          </p:cNvSpPr>
+          <p:nvPr>
+            <p:ph type="subTitle" idx="1"/>
+          </p:nvPr>
+        </p:nvSpPr>
+        <p:spPr>
+          <a:xfrm>
+            <a:off x="1371600" y="3009900"/>
+            <a:ext cx="6400800" cy="1752600"/>
+          </a:xfrm>
+        </p:spPr>
+        <p:txBody>
+          <a:bodyPr/>
+          <a:lstStyle/>
+          <a:p>
+            <a:endParaRPr lang="en-US"/>
+          </a:p>
+        </p:txBody>
+      </p:sp>
     </p:spTree>
     <p:extLst>
       <p:ext uri="{BB962C8B-B14F-4D97-AF65-F5344CB8AC3E}">
@@ -3907,29 +3959,84 @@
           </a:p>
         </p:txBody>
       </p:sp>
-      <p:sp>
-        <p:nvSpPr>
-          <p:cNvPr id="3" name="Content Placeholder 2"/>
-          <p:cNvSpPr>
-            <a:spLocks noGrp="1"/>
-          </p:cNvSpPr>
+      <p:pic>
+        <p:nvPicPr>
+          <p:cNvPr id="4" name="Content Placeholder 3"/>
+          <p:cNvPicPr>
+            <a:picLocks noGrp="1" noChangeAspect="1"/>
+          </p:cNvPicPr>
           <p:nvPr>
             <p:ph idx="1"/>
           </p:nvPr>
-        </p:nvSpPr>
-        <p:spPr/>
-        <p:txBody>
-          <a:bodyPr/>
-          <a:lstStyle/>
-          <a:p>
-            <a:endParaRPr lang="en-US" dirty="0"/>
+        </p:nvPicPr>
+        <p:blipFill>
+          <a:blip r:embed="rId2">
+            <a:extLst>
+              <a:ext uri="{28A0092B-C50C-407E-A947-70E740481C1C}">
+                <a14:useLocalDpi xmlns:a14="http://schemas.microsoft.com/office/drawing/2010/main" val="0"/>
+              </a:ext>
+            </a:extLst>
+          </a:blip>
+          <a:stretch>
+            <a:fillRect/>
+          </a:stretch>
+        </p:blipFill>
+        <p:spPr>
+          <a:xfrm>
+            <a:off x="1975104" y="1232692"/>
+            <a:ext cx="5879590" cy="5470849"/>
+          </a:xfrm>
+        </p:spPr>
+      </p:pic>
+      <p:sp>
+        <p:nvSpPr>
+          <p:cNvPr id="6" name="Rectangle 5"/>
+          <p:cNvSpPr/>
+          <p:nvPr/>
+        </p:nvSpPr>
+        <p:spPr>
+          <a:xfrm>
+            <a:off x="1981199" y="1235675"/>
+            <a:ext cx="2084513" cy="914400"/>
+          </a:xfrm>
+          <a:prstGeom prst="rect">
+            <a:avLst/>
+          </a:prstGeom>
+          <a:solidFill>
+            <a:srgbClr val="243894"/>
+          </a:solidFill>
+          <a:ln>
+            <a:noFill/>
+          </a:ln>
+          <a:effectLst/>
+        </p:spPr>
+        <p:style>
+          <a:lnRef idx="1">
+            <a:schemeClr val="accent1"/>
+          </a:lnRef>
+          <a:fillRef idx="3">
+            <a:schemeClr val="accent1"/>
+          </a:fillRef>
+          <a:effectRef idx="2">
+            <a:schemeClr val="accent1"/>
+          </a:effectRef>
+          <a:fontRef idx="minor">
+            <a:schemeClr val="lt1"/>
+          </a:fontRef>
+        </p:style>
+        <p:txBody>
+          <a:bodyPr rtlCol="0" anchor="ctr"/>
+          <a:lstStyle/>
+          <a:p>
+            <a:pPr algn="ctr"/>
+            <a:endParaRPr lang="en-US"/>
           </a:p>
         </p:txBody>
       </p:sp>
     </p:spTree>
     <p:extLst>
       <p:ext uri="{BB962C8B-B14F-4D97-AF65-F5344CB8AC3E}">
-        <p14:creationId xmlns:p14="http://schemas.microsoft.com/office/powerpoint/2010/main" val="1648046603"/>
+        <p14:creationId xmlns:p14="http://schemas.microsoft.com/office/powerpoint/2010/main" val="1101768987"/>
       </p:ext>
     </p:extLst>
   </p:cSld>
@@ -3947,6 +4054,278 @@
 </file>
 
 <file path=ppt/slides/slide3.xml><?xml version="1.0" encoding="utf-8"?>
+<p:sld xmlns:a="http://schemas.openxmlformats.org/drawingml/2006/main" xmlns:r="http://schemas.openxmlformats.org/officeDocument/2006/relationships" xmlns:p="http://schemas.openxmlformats.org/presentationml/2006/main">
+  <p:cSld>
+    <p:spTree>
+      <p:nvGrpSpPr>
+        <p:cNvPr id="1" name=""/>
+        <p:cNvGrpSpPr/>
+        <p:nvPr/>
+      </p:nvGrpSpPr>
+      <p:grpSpPr>
+        <a:xfrm>
+          <a:off x="0" y="0"/>
+          <a:ext cx="0" cy="0"/>
+          <a:chOff x="0" y="0"/>
+          <a:chExt cx="0" cy="0"/>
+        </a:xfrm>
+      </p:grpSpPr>
+      <p:sp>
+        <p:nvSpPr>
+          <p:cNvPr id="2" name="Title 1"/>
+          <p:cNvSpPr>
+            <a:spLocks noGrp="1"/>
+          </p:cNvSpPr>
+          <p:nvPr>
+            <p:ph type="title"/>
+          </p:nvPr>
+        </p:nvSpPr>
+        <p:spPr>
+          <a:xfrm>
+            <a:off x="457200" y="157410"/>
+            <a:ext cx="8229600" cy="1143000"/>
+          </a:xfrm>
+        </p:spPr>
+        <p:txBody>
+          <a:bodyPr/>
+          <a:lstStyle/>
+          <a:p>
+            <a:endParaRPr lang="en-US" dirty="0">
+              <a:solidFill>
+                <a:srgbClr val="26374B"/>
+              </a:solidFill>
+            </a:endParaRPr>
+          </a:p>
+        </p:txBody>
+      </p:sp>
+      <p:pic>
+        <p:nvPicPr>
+          <p:cNvPr id="4" name="Content Placeholder 3"/>
+          <p:cNvPicPr>
+            <a:picLocks noGrp="1" noChangeAspect="1"/>
+          </p:cNvPicPr>
+          <p:nvPr>
+            <p:ph idx="1"/>
+          </p:nvPr>
+        </p:nvPicPr>
+        <p:blipFill rotWithShape="1">
+          <a:blip r:embed="rId2">
+            <a:extLst>
+              <a:ext uri="{28A0092B-C50C-407E-A947-70E740481C1C}">
+                <a14:useLocalDpi xmlns:a14="http://schemas.microsoft.com/office/drawing/2010/main" val="0"/>
+              </a:ext>
+            </a:extLst>
+          </a:blip>
+          <a:srcRect l="17167" t="26681" r="28184" b="17373"/>
+          <a:stretch/>
+        </p:blipFill>
+        <p:spPr>
+          <a:xfrm>
+            <a:off x="2971800" y="2679701"/>
+            <a:ext cx="3213100" cy="3060700"/>
+          </a:xfrm>
+          <a:prstGeom prst="ellipse">
+            <a:avLst/>
+          </a:prstGeom>
+        </p:spPr>
+      </p:pic>
+    </p:spTree>
+    <p:extLst>
+      <p:ext uri="{BB962C8B-B14F-4D97-AF65-F5344CB8AC3E}">
+        <p14:creationId xmlns:p14="http://schemas.microsoft.com/office/powerpoint/2010/main" val="1740466460"/>
+      </p:ext>
+    </p:extLst>
+  </p:cSld>
+  <p:clrMapOvr>
+    <a:masterClrMapping/>
+  </p:clrMapOvr>
+  <p:timing>
+    <p:tnLst>
+      <p:par>
+        <p:cTn id="1" dur="indefinite" restart="never" nodeType="tmRoot"/>
+      </p:par>
+    </p:tnLst>
+  </p:timing>
+</p:sld>
+</file>
+
+<file path=ppt/slides/slide4.xml><?xml version="1.0" encoding="utf-8"?>
+<p:sld xmlns:a="http://schemas.openxmlformats.org/drawingml/2006/main" xmlns:r="http://schemas.openxmlformats.org/officeDocument/2006/relationships" xmlns:p="http://schemas.openxmlformats.org/presentationml/2006/main">
+  <p:cSld>
+    <p:spTree>
+      <p:nvGrpSpPr>
+        <p:cNvPr id="1" name=""/>
+        <p:cNvGrpSpPr/>
+        <p:nvPr/>
+      </p:nvGrpSpPr>
+      <p:grpSpPr>
+        <a:xfrm>
+          <a:off x="0" y="0"/>
+          <a:ext cx="0" cy="0"/>
+          <a:chOff x="0" y="0"/>
+          <a:chExt cx="0" cy="0"/>
+        </a:xfrm>
+      </p:grpSpPr>
+      <p:sp>
+        <p:nvSpPr>
+          <p:cNvPr id="2" name="Title 1"/>
+          <p:cNvSpPr>
+            <a:spLocks noGrp="1"/>
+          </p:cNvSpPr>
+          <p:nvPr>
+            <p:ph type="title"/>
+          </p:nvPr>
+        </p:nvSpPr>
+        <p:spPr>
+          <a:xfrm>
+            <a:off x="457200" y="157410"/>
+            <a:ext cx="8229600" cy="1143000"/>
+          </a:xfrm>
+        </p:spPr>
+        <p:txBody>
+          <a:bodyPr/>
+          <a:lstStyle/>
+          <a:p>
+            <a:endParaRPr lang="en-US" dirty="0">
+              <a:solidFill>
+                <a:srgbClr val="26374B"/>
+              </a:solidFill>
+            </a:endParaRPr>
+          </a:p>
+        </p:txBody>
+      </p:sp>
+      <p:sp>
+        <p:nvSpPr>
+          <p:cNvPr id="3" name="Content Placeholder 2"/>
+          <p:cNvSpPr>
+            <a:spLocks noGrp="1"/>
+          </p:cNvSpPr>
+          <p:nvPr>
+            <p:ph idx="1"/>
+          </p:nvPr>
+        </p:nvSpPr>
+        <p:spPr/>
+        <p:txBody>
+          <a:bodyPr/>
+          <a:lstStyle/>
+          <a:p>
+            <a:endParaRPr lang="en-US" dirty="0"/>
+          </a:p>
+        </p:txBody>
+      </p:sp>
+    </p:spTree>
+    <p:extLst>
+      <p:ext uri="{BB962C8B-B14F-4D97-AF65-F5344CB8AC3E}">
+        <p14:creationId xmlns:p14="http://schemas.microsoft.com/office/powerpoint/2010/main" val="1210504029"/>
+      </p:ext>
+    </p:extLst>
+  </p:cSld>
+  <p:clrMapOvr>
+    <a:masterClrMapping/>
+  </p:clrMapOvr>
+  <p:timing>
+    <p:tnLst>
+      <p:par>
+        <p:cTn id="1" dur="indefinite" restart="never" nodeType="tmRoot"/>
+      </p:par>
+    </p:tnLst>
+  </p:timing>
+</p:sld>
+</file>
+
+<file path=ppt/slides/slide5.xml><?xml version="1.0" encoding="utf-8"?>
+<p:sld xmlns:a="http://schemas.openxmlformats.org/drawingml/2006/main" xmlns:r="http://schemas.openxmlformats.org/officeDocument/2006/relationships" xmlns:p="http://schemas.openxmlformats.org/presentationml/2006/main">
+  <p:cSld>
+    <p:spTree>
+      <p:nvGrpSpPr>
+        <p:cNvPr id="1" name=""/>
+        <p:cNvGrpSpPr/>
+        <p:nvPr/>
+      </p:nvGrpSpPr>
+      <p:grpSpPr>
+        <a:xfrm>
+          <a:off x="0" y="0"/>
+          <a:ext cx="0" cy="0"/>
+          <a:chOff x="0" y="0"/>
+          <a:chExt cx="0" cy="0"/>
+        </a:xfrm>
+      </p:grpSpPr>
+      <p:sp>
+        <p:nvSpPr>
+          <p:cNvPr id="2" name="Title 1"/>
+          <p:cNvSpPr>
+            <a:spLocks noGrp="1"/>
+          </p:cNvSpPr>
+          <p:nvPr>
+            <p:ph type="title"/>
+          </p:nvPr>
+        </p:nvSpPr>
+        <p:spPr>
+          <a:xfrm>
+            <a:off x="457200" y="157410"/>
+            <a:ext cx="8229600" cy="1143000"/>
+          </a:xfrm>
+        </p:spPr>
+        <p:txBody>
+          <a:bodyPr/>
+          <a:lstStyle/>
+          <a:p>
+            <a:r>
+              <a:rPr lang="en-US" dirty="0" smtClean="0">
+                <a:solidFill>
+                  <a:srgbClr val="26374B"/>
+                </a:solidFill>
+              </a:rPr>
+              <a:t>References</a:t>
+            </a:r>
+            <a:endParaRPr lang="en-US" dirty="0">
+              <a:solidFill>
+                <a:srgbClr val="26374B"/>
+              </a:solidFill>
+            </a:endParaRPr>
+          </a:p>
+        </p:txBody>
+      </p:sp>
+      <p:sp>
+        <p:nvSpPr>
+          <p:cNvPr id="3" name="Content Placeholder 2"/>
+          <p:cNvSpPr>
+            <a:spLocks noGrp="1"/>
+          </p:cNvSpPr>
+          <p:nvPr>
+            <p:ph idx="1"/>
+          </p:nvPr>
+        </p:nvSpPr>
+        <p:spPr/>
+        <p:txBody>
+          <a:bodyPr/>
+          <a:lstStyle/>
+          <a:p>
+            <a:endParaRPr lang="en-US" dirty="0"/>
+          </a:p>
+        </p:txBody>
+      </p:sp>
+    </p:spTree>
+    <p:extLst>
+      <p:ext uri="{BB962C8B-B14F-4D97-AF65-F5344CB8AC3E}">
+        <p14:creationId xmlns:p14="http://schemas.microsoft.com/office/powerpoint/2010/main" val="2023121167"/>
+      </p:ext>
+    </p:extLst>
+  </p:cSld>
+  <p:clrMapOvr>
+    <a:masterClrMapping/>
+  </p:clrMapOvr>
+  <p:timing>
+    <p:tnLst>
+      <p:par>
+        <p:cTn id="1" dur="indefinite" restart="never" nodeType="tmRoot"/>
+      </p:par>
+    </p:tnLst>
+  </p:timing>
+</p:sld>
+</file>
+
+<file path=ppt/slides/slide6.xml><?xml version="1.0" encoding="utf-8"?>
 <p:sld xmlns:a="http://schemas.openxmlformats.org/drawingml/2006/main" xmlns:r="http://schemas.openxmlformats.org/officeDocument/2006/relationships" xmlns:p="http://schemas.openxmlformats.org/presentationml/2006/main">
   <p:cSld>
     <p:bg>
@@ -4595,32 +4974,24 @@
               <a:buNone/>
             </a:pPr>
             <a:r>
-              <a:rPr lang="en-US" sz="2700" i="1" dirty="0" smtClean="0">
+              <a:rPr lang="en-US" sz="2700" i="1" dirty="0">
                 <a:solidFill>
-                  <a:srgbClr val="C00000"/>
+                  <a:srgbClr val="236FC7"/>
                 </a:solidFill>
               </a:rPr>
-              <a:t>http</a:t>
-            </a:r>
-            <a:r>
-              <a:rPr lang="en-US" sz="2700" i="1" dirty="0" smtClean="0">
-                <a:solidFill>
-                  <a:srgbClr val="C00000"/>
-                </a:solidFill>
-              </a:rPr>
-              <a:t>://</a:t>
+              <a:t>http://</a:t>
             </a:r>
             <a:r>
               <a:rPr lang="en-US" sz="2700" i="1" dirty="0" err="1" smtClean="0">
                 <a:solidFill>
-                  <a:srgbClr val="C00000"/>
+                  <a:srgbClr val="236FC7"/>
                 </a:solidFill>
               </a:rPr>
               <a:t>library.northeastern.edu</a:t>
             </a:r>
             <a:endParaRPr lang="en-US" sz="2700" i="1" dirty="0" smtClean="0">
               <a:solidFill>
-                <a:srgbClr val="C00000"/>
+                <a:srgbClr val="236FC7"/>
               </a:solidFill>
             </a:endParaRPr>
           </a:p>
@@ -4666,6 +5037,181 @@
     <p:extLst>
       <p:ext uri="{BB962C8B-B14F-4D97-AF65-F5344CB8AC3E}">
         <p14:creationId xmlns:p14="http://schemas.microsoft.com/office/powerpoint/2010/main" val="474705620"/>
+      </p:ext>
+    </p:extLst>
+  </p:cSld>
+  <p:clrMapOvr>
+    <a:masterClrMapping/>
+  </p:clrMapOvr>
+  <p:timing>
+    <p:tnLst>
+      <p:par>
+        <p:cTn id="1" dur="indefinite" restart="never" nodeType="tmRoot"/>
+      </p:par>
+    </p:tnLst>
+  </p:timing>
+</p:sld>
+</file>
+
+<file path=ppt/slides/slide7.xml><?xml version="1.0" encoding="utf-8"?>
+<p:sld xmlns:a="http://schemas.openxmlformats.org/drawingml/2006/main" xmlns:r="http://schemas.openxmlformats.org/officeDocument/2006/relationships" xmlns:p="http://schemas.openxmlformats.org/presentationml/2006/main">
+  <p:cSld>
+    <p:spTree>
+      <p:nvGrpSpPr>
+        <p:cNvPr id="1" name=""/>
+        <p:cNvGrpSpPr/>
+        <p:nvPr/>
+      </p:nvGrpSpPr>
+      <p:grpSpPr>
+        <a:xfrm>
+          <a:off x="0" y="0"/>
+          <a:ext cx="0" cy="0"/>
+          <a:chOff x="0" y="0"/>
+          <a:chExt cx="0" cy="0"/>
+        </a:xfrm>
+      </p:grpSpPr>
+      <p:sp>
+        <p:nvSpPr>
+          <p:cNvPr id="2" name="Title 1"/>
+          <p:cNvSpPr>
+            <a:spLocks noGrp="1"/>
+          </p:cNvSpPr>
+          <p:nvPr>
+            <p:ph type="title"/>
+          </p:nvPr>
+        </p:nvSpPr>
+        <p:spPr>
+          <a:xfrm>
+            <a:off x="457200" y="157410"/>
+            <a:ext cx="8229600" cy="1143000"/>
+          </a:xfrm>
+        </p:spPr>
+        <p:txBody>
+          <a:bodyPr/>
+          <a:lstStyle/>
+          <a:p>
+            <a:endParaRPr lang="en-US" dirty="0">
+              <a:solidFill>
+                <a:srgbClr val="26374B"/>
+              </a:solidFill>
+            </a:endParaRPr>
+          </a:p>
+        </p:txBody>
+      </p:sp>
+      <p:sp>
+        <p:nvSpPr>
+          <p:cNvPr id="12" name="Circular Arrow 11"/>
+          <p:cNvSpPr/>
+          <p:nvPr/>
+        </p:nvSpPr>
+        <p:spPr>
+          <a:xfrm>
+            <a:off x="2254538" y="1385191"/>
+            <a:ext cx="4640185" cy="4978584"/>
+          </a:xfrm>
+          <a:prstGeom prst="circularArrow">
+            <a:avLst>
+              <a:gd name="adj1" fmla="val 7820"/>
+              <a:gd name="adj2" fmla="val 885954"/>
+              <a:gd name="adj3" fmla="val 85957"/>
+              <a:gd name="adj4" fmla="val 10819082"/>
+              <a:gd name="adj5" fmla="val 3910"/>
+            </a:avLst>
+          </a:prstGeom>
+          <a:solidFill>
+            <a:srgbClr val="243894"/>
+          </a:solidFill>
+          <a:effectLst/>
+        </p:spPr>
+        <p:style>
+          <a:lnRef idx="0">
+            <a:schemeClr val="lt1">
+              <a:hueOff val="0"/>
+              <a:satOff val="0"/>
+              <a:lumOff val="0"/>
+              <a:alphaOff val="0"/>
+            </a:schemeClr>
+          </a:lnRef>
+          <a:fillRef idx="3">
+            <a:schemeClr val="accent1">
+              <a:hueOff val="0"/>
+              <a:satOff val="0"/>
+              <a:lumOff val="0"/>
+              <a:alphaOff val="0"/>
+            </a:schemeClr>
+          </a:fillRef>
+          <a:effectRef idx="2">
+            <a:schemeClr val="accent1">
+              <a:hueOff val="0"/>
+              <a:satOff val="0"/>
+              <a:lumOff val="0"/>
+              <a:alphaOff val="0"/>
+            </a:schemeClr>
+          </a:effectRef>
+          <a:fontRef idx="minor">
+            <a:schemeClr val="lt1"/>
+          </a:fontRef>
+        </p:style>
+      </p:sp>
+      <p:sp>
+        <p:nvSpPr>
+          <p:cNvPr id="15" name="Circular Arrow 14"/>
+          <p:cNvSpPr/>
+          <p:nvPr/>
+        </p:nvSpPr>
+        <p:spPr>
+          <a:xfrm rot="10800000">
+            <a:off x="2254538" y="1371508"/>
+            <a:ext cx="4640185" cy="4978584"/>
+          </a:xfrm>
+          <a:prstGeom prst="circularArrow">
+            <a:avLst>
+              <a:gd name="adj1" fmla="val 7820"/>
+              <a:gd name="adj2" fmla="val 885954"/>
+              <a:gd name="adj3" fmla="val 85957"/>
+              <a:gd name="adj4" fmla="val 10819082"/>
+              <a:gd name="adj5" fmla="val 3910"/>
+            </a:avLst>
+          </a:prstGeom>
+          <a:solidFill>
+            <a:srgbClr val="243894"/>
+          </a:solidFill>
+          <a:effectLst/>
+        </p:spPr>
+        <p:style>
+          <a:lnRef idx="0">
+            <a:schemeClr val="lt1">
+              <a:hueOff val="0"/>
+              <a:satOff val="0"/>
+              <a:lumOff val="0"/>
+              <a:alphaOff val="0"/>
+            </a:schemeClr>
+          </a:lnRef>
+          <a:fillRef idx="3">
+            <a:schemeClr val="accent1">
+              <a:hueOff val="0"/>
+              <a:satOff val="0"/>
+              <a:lumOff val="0"/>
+              <a:alphaOff val="0"/>
+            </a:schemeClr>
+          </a:fillRef>
+          <a:effectRef idx="2">
+            <a:schemeClr val="accent1">
+              <a:hueOff val="0"/>
+              <a:satOff val="0"/>
+              <a:lumOff val="0"/>
+              <a:alphaOff val="0"/>
+            </a:schemeClr>
+          </a:effectRef>
+          <a:fontRef idx="minor">
+            <a:schemeClr val="lt1"/>
+          </a:fontRef>
+        </p:style>
+      </p:sp>
+    </p:spTree>
+    <p:extLst>
+      <p:ext uri="{BB962C8B-B14F-4D97-AF65-F5344CB8AC3E}">
+        <p14:creationId xmlns:p14="http://schemas.microsoft.com/office/powerpoint/2010/main" val="1648046603"/>
       </p:ext>
     </p:extLst>
   </p:cSld>

</xml_diff>

<commit_message>
Adding all DS slides
</commit_message>
<xml_diff>
--- a/Presentations/Open Repositories 2016/Digital Stewardship/DigitalStewardship.pptx
+++ b/Presentations/Open Repositories 2016/Digital Stewardship/DigitalStewardship.pptx
@@ -5,16 +5,18 @@
     <p:sldMasterId id="2147483660" r:id="rId1"/>
   </p:sldMasterIdLst>
   <p:notesMasterIdLst>
-    <p:notesMasterId r:id="rId9"/>
+    <p:notesMasterId r:id="rId11"/>
   </p:notesMasterIdLst>
   <p:sldIdLst>
     <p:sldId id="257" r:id="rId2"/>
     <p:sldId id="269" r:id="rId3"/>
-    <p:sldId id="270" r:id="rId4"/>
-    <p:sldId id="268" r:id="rId5"/>
-    <p:sldId id="266" r:id="rId6"/>
-    <p:sldId id="265" r:id="rId7"/>
-    <p:sldId id="258" r:id="rId8"/>
+    <p:sldId id="271" r:id="rId4"/>
+    <p:sldId id="276" r:id="rId5"/>
+    <p:sldId id="272" r:id="rId6"/>
+    <p:sldId id="274" r:id="rId7"/>
+    <p:sldId id="275" r:id="rId8"/>
+    <p:sldId id="265" r:id="rId9"/>
+    <p:sldId id="258" r:id="rId10"/>
   </p:sldIdLst>
   <p:sldSz cx="9144000" cy="6858000" type="screen4x3"/>
   <p:notesSz cx="6858000" cy="9144000"/>
@@ -116,12 +118,12 @@
   <p:extLst>
     <p:ext uri="{EFAFB233-063F-42B5-8137-9DF3F51BA10A}">
       <p15:sldGuideLst xmlns:p15="http://schemas.microsoft.com/office/powerpoint/2012/main">
-        <p15:guide id="1" orient="horz" pos="2160">
+        <p15:guide id="1" orient="horz" pos="168" userDrawn="1">
           <p15:clr>
             <a:srgbClr val="A4A3A4"/>
           </p15:clr>
         </p15:guide>
-        <p15:guide id="2" pos="2880">
+        <p15:guide id="2" pos="2880" userDrawn="1">
           <p15:clr>
             <a:srgbClr val="A4A3A4"/>
           </p15:clr>
@@ -214,7 +216,7 @@
           <a:p>
             <a:fld id="{D9ECFEF1-2E88-E646-A99D-93EC0DB2D22C}" type="datetimeFigureOut">
               <a:rPr lang="en-US" smtClean="0"/>
-              <a:t>6/6/16</a:t>
+              <a:t>6/8/16</a:t>
             </a:fld>
             <a:endParaRPr lang="en-US"/>
           </a:p>
@@ -639,7 +641,7 @@
           <a:p>
             <a:fld id="{F0D14C87-DF6A-634A-AD3D-CAB6EA4C158C}" type="slidenum">
               <a:rPr lang="en-US" smtClean="0"/>
-              <a:t>6</a:t>
+              <a:t>8</a:t>
             </a:fld>
             <a:endParaRPr lang="en-US"/>
           </a:p>
@@ -839,7 +841,7 @@
           <a:p>
             <a:fld id="{C952E0D9-C4C6-B144-92E9-4E0D31DDAA26}" type="datetimeFigureOut">
               <a:rPr lang="en-US" smtClean="0"/>
-              <a:t>6/6/16</a:t>
+              <a:t>6/8/16</a:t>
             </a:fld>
             <a:endParaRPr lang="en-US"/>
           </a:p>
@@ -1009,7 +1011,7 @@
           <a:p>
             <a:fld id="{C952E0D9-C4C6-B144-92E9-4E0D31DDAA26}" type="datetimeFigureOut">
               <a:rPr lang="en-US" smtClean="0"/>
-              <a:t>6/6/16</a:t>
+              <a:t>6/8/16</a:t>
             </a:fld>
             <a:endParaRPr lang="en-US"/>
           </a:p>
@@ -1189,7 +1191,7 @@
           <a:p>
             <a:fld id="{C952E0D9-C4C6-B144-92E9-4E0D31DDAA26}" type="datetimeFigureOut">
               <a:rPr lang="en-US" smtClean="0"/>
-              <a:t>6/6/16</a:t>
+              <a:t>6/8/16</a:t>
             </a:fld>
             <a:endParaRPr lang="en-US"/>
           </a:p>
@@ -1359,7 +1361,7 @@
           <a:p>
             <a:fld id="{C952E0D9-C4C6-B144-92E9-4E0D31DDAA26}" type="datetimeFigureOut">
               <a:rPr lang="en-US" smtClean="0"/>
-              <a:t>6/6/16</a:t>
+              <a:t>6/8/16</a:t>
             </a:fld>
             <a:endParaRPr lang="en-US"/>
           </a:p>
@@ -1605,7 +1607,7 @@
           <a:p>
             <a:fld id="{C952E0D9-C4C6-B144-92E9-4E0D31DDAA26}" type="datetimeFigureOut">
               <a:rPr lang="en-US" smtClean="0"/>
-              <a:t>6/6/16</a:t>
+              <a:t>6/8/16</a:t>
             </a:fld>
             <a:endParaRPr lang="en-US"/>
           </a:p>
@@ -1893,7 +1895,7 @@
           <a:p>
             <a:fld id="{C952E0D9-C4C6-B144-92E9-4E0D31DDAA26}" type="datetimeFigureOut">
               <a:rPr lang="en-US" smtClean="0"/>
-              <a:t>6/6/16</a:t>
+              <a:t>6/8/16</a:t>
             </a:fld>
             <a:endParaRPr lang="en-US"/>
           </a:p>
@@ -2315,7 +2317,7 @@
           <a:p>
             <a:fld id="{C952E0D9-C4C6-B144-92E9-4E0D31DDAA26}" type="datetimeFigureOut">
               <a:rPr lang="en-US" smtClean="0"/>
-              <a:t>6/6/16</a:t>
+              <a:t>6/8/16</a:t>
             </a:fld>
             <a:endParaRPr lang="en-US"/>
           </a:p>
@@ -2433,7 +2435,7 @@
           <a:p>
             <a:fld id="{C952E0D9-C4C6-B144-92E9-4E0D31DDAA26}" type="datetimeFigureOut">
               <a:rPr lang="en-US" smtClean="0"/>
-              <a:t>6/6/16</a:t>
+              <a:t>6/8/16</a:t>
             </a:fld>
             <a:endParaRPr lang="en-US"/>
           </a:p>
@@ -2528,7 +2530,7 @@
           <a:p>
             <a:fld id="{C952E0D9-C4C6-B144-92E9-4E0D31DDAA26}" type="datetimeFigureOut">
               <a:rPr lang="en-US" smtClean="0"/>
-              <a:t>6/6/16</a:t>
+              <a:t>6/8/16</a:t>
             </a:fld>
             <a:endParaRPr lang="en-US"/>
           </a:p>
@@ -2805,7 +2807,7 @@
           <a:p>
             <a:fld id="{C952E0D9-C4C6-B144-92E9-4E0D31DDAA26}" type="datetimeFigureOut">
               <a:rPr lang="en-US" smtClean="0"/>
-              <a:t>6/6/16</a:t>
+              <a:t>6/8/16</a:t>
             </a:fld>
             <a:endParaRPr lang="en-US"/>
           </a:p>
@@ -3062,7 +3064,7 @@
           <a:p>
             <a:fld id="{C952E0D9-C4C6-B144-92E9-4E0D31DDAA26}" type="datetimeFigureOut">
               <a:rPr lang="en-US" smtClean="0"/>
-              <a:t>6/6/16</a:t>
+              <a:t>6/8/16</a:t>
             </a:fld>
             <a:endParaRPr lang="en-US"/>
           </a:p>
@@ -3278,7 +3280,7 @@
           <a:p>
             <a:fld id="{C952E0D9-C4C6-B144-92E9-4E0D31DDAA26}" type="datetimeFigureOut">
               <a:rPr lang="en-US" smtClean="0"/>
-              <a:t>6/6/16</a:t>
+              <a:t>6/8/16</a:t>
             </a:fld>
             <a:endParaRPr lang="en-US"/>
           </a:p>
@@ -3866,7 +3868,27 @@
           <a:bodyPr/>
           <a:lstStyle/>
           <a:p>
-            <a:endParaRPr lang="en-US"/>
+            <a:r>
+              <a:rPr lang="en-US" dirty="0">
+                <a:solidFill>
+                  <a:srgbClr val="26374B"/>
+                </a:solidFill>
+              </a:rPr>
+              <a:t>Digital </a:t>
+            </a:r>
+            <a:r>
+              <a:rPr lang="en-US" dirty="0" smtClean="0">
+                <a:solidFill>
+                  <a:srgbClr val="26374B"/>
+                </a:solidFill>
+              </a:rPr>
+              <a:t>Repositories</a:t>
+            </a:r>
+            <a:endParaRPr lang="en-US" dirty="0">
+              <a:solidFill>
+                <a:srgbClr val="26374B"/>
+              </a:solidFill>
+            </a:endParaRPr>
           </a:p>
         </p:txBody>
       </p:sp>
@@ -3890,7 +3912,15 @@
           <a:bodyPr/>
           <a:lstStyle/>
           <a:p>
-            <a:endParaRPr lang="en-US"/>
+            <a:r>
+              <a:rPr lang="en-US" dirty="0">
+                <a:solidFill>
+                  <a:srgbClr val="26374B"/>
+                </a:solidFill>
+              </a:rPr>
+              <a:t>Gateways to Digital Stewardship</a:t>
+            </a:r>
+            <a:endParaRPr lang="en-US" dirty="0"/>
           </a:p>
         </p:txBody>
       </p:sp>
@@ -3942,15 +3972,22 @@
           </p:nvPr>
         </p:nvSpPr>
         <p:spPr>
-          <a:xfrm>
-            <a:off x="457200" y="157410"/>
-            <a:ext cx="8229600" cy="1143000"/>
-          </a:xfrm>
+          <a:ln>
+            <a:noFill/>
+          </a:ln>
         </p:spPr>
         <p:txBody>
           <a:bodyPr/>
           <a:lstStyle/>
           <a:p>
+            <a:r>
+              <a:rPr lang="en-US" dirty="0" smtClean="0">
+                <a:solidFill>
+                  <a:srgbClr val="26374B"/>
+                </a:solidFill>
+              </a:rPr>
+              <a:t>Digital Stewardship in Action</a:t>
+            </a:r>
             <a:endParaRPr lang="en-US" dirty="0">
               <a:solidFill>
                 <a:srgbClr val="26374B"/>
@@ -3959,15 +3996,107 @@
           </a:p>
         </p:txBody>
       </p:sp>
+      <p:sp>
+        <p:nvSpPr>
+          <p:cNvPr id="7" name="Content Placeholder 6"/>
+          <p:cNvSpPr>
+            <a:spLocks noGrp="1"/>
+          </p:cNvSpPr>
+          <p:nvPr>
+            <p:ph sz="half" idx="2"/>
+          </p:nvPr>
+        </p:nvSpPr>
+        <p:spPr>
+          <a:xfrm>
+            <a:off x="6337300" y="2387601"/>
+            <a:ext cx="1968500" cy="2057399"/>
+          </a:xfrm>
+        </p:spPr>
+        <p:txBody>
+          <a:bodyPr/>
+          <a:lstStyle/>
+          <a:p>
+            <a:pPr>
+              <a:buClr>
+                <a:srgbClr val="26374B"/>
+              </a:buClr>
+              <a:buFont typeface="Arial" charset="0"/>
+              <a:buChar char="•"/>
+            </a:pPr>
+            <a:r>
+              <a:rPr lang="en-US" dirty="0" smtClean="0">
+                <a:solidFill>
+                  <a:srgbClr val="26374B"/>
+                </a:solidFill>
+              </a:rPr>
+              <a:t>Plan</a:t>
+            </a:r>
+          </a:p>
+          <a:p>
+            <a:pPr>
+              <a:buClr>
+                <a:srgbClr val="26374B"/>
+              </a:buClr>
+              <a:buFont typeface="Arial" charset="0"/>
+              <a:buChar char="•"/>
+            </a:pPr>
+            <a:r>
+              <a:rPr lang="en-US" dirty="0" smtClean="0">
+                <a:solidFill>
+                  <a:srgbClr val="26374B"/>
+                </a:solidFill>
+              </a:rPr>
+              <a:t>Collect</a:t>
+            </a:r>
+          </a:p>
+          <a:p>
+            <a:pPr>
+              <a:buClr>
+                <a:srgbClr val="26374B"/>
+              </a:buClr>
+              <a:buFont typeface="Arial" charset="0"/>
+              <a:buChar char="•"/>
+            </a:pPr>
+            <a:r>
+              <a:rPr lang="en-US" dirty="0" smtClean="0">
+                <a:solidFill>
+                  <a:srgbClr val="26374B"/>
+                </a:solidFill>
+              </a:rPr>
+              <a:t>Describe</a:t>
+            </a:r>
+          </a:p>
+          <a:p>
+            <a:pPr>
+              <a:buClr>
+                <a:srgbClr val="26374B"/>
+              </a:buClr>
+              <a:buFont typeface="Arial" charset="0"/>
+              <a:buChar char="•"/>
+            </a:pPr>
+            <a:r>
+              <a:rPr lang="en-US" dirty="0" smtClean="0">
+                <a:solidFill>
+                  <a:srgbClr val="26374B"/>
+                </a:solidFill>
+              </a:rPr>
+              <a:t>Maintain</a:t>
+            </a:r>
+            <a:endParaRPr lang="en-US" dirty="0">
+              <a:solidFill>
+                <a:srgbClr val="26374B"/>
+              </a:solidFill>
+            </a:endParaRPr>
+          </a:p>
+        </p:txBody>
+      </p:sp>
       <p:pic>
         <p:nvPicPr>
-          <p:cNvPr id="4" name="Content Placeholder 3"/>
+          <p:cNvPr id="8" name="Content Placeholder 3"/>
           <p:cNvPicPr>
-            <a:picLocks noGrp="1" noChangeAspect="1"/>
+            <a:picLocks noChangeAspect="1"/>
           </p:cNvPicPr>
-          <p:nvPr>
-            <p:ph idx="1"/>
-          </p:nvPr>
+          <p:nvPr/>
         </p:nvPicPr>
         <p:blipFill>
           <a:blip r:embed="rId2">
@@ -3983,21 +4112,24 @@
         </p:blipFill>
         <p:spPr>
           <a:xfrm>
-            <a:off x="1975104" y="1232692"/>
-            <a:ext cx="5879590" cy="5470849"/>
+            <a:off x="525565" y="1367479"/>
+            <a:ext cx="5532335" cy="5147735"/>
           </a:xfrm>
+          <a:prstGeom prst="rect">
+            <a:avLst/>
+          </a:prstGeom>
         </p:spPr>
       </p:pic>
       <p:sp>
         <p:nvSpPr>
-          <p:cNvPr id="6" name="Rectangle 5"/>
+          <p:cNvPr id="9" name="Rectangle 8"/>
           <p:cNvSpPr/>
           <p:nvPr/>
         </p:nvSpPr>
         <p:spPr>
           <a:xfrm>
-            <a:off x="1981199" y="1235675"/>
-            <a:ext cx="2084513" cy="914400"/>
+            <a:off x="531663" y="1370461"/>
+            <a:ext cx="1615627" cy="700085"/>
           </a:xfrm>
           <a:prstGeom prst="rect">
             <a:avLst/>
@@ -4081,15 +4213,22 @@
           </p:nvPr>
         </p:nvSpPr>
         <p:spPr>
-          <a:xfrm>
-            <a:off x="457200" y="157410"/>
-            <a:ext cx="8229600" cy="1143000"/>
-          </a:xfrm>
+          <a:ln>
+            <a:noFill/>
+          </a:ln>
         </p:spPr>
         <p:txBody>
           <a:bodyPr/>
           <a:lstStyle/>
           <a:p>
+            <a:r>
+              <a:rPr lang="en-US" dirty="0" smtClean="0">
+                <a:solidFill>
+                  <a:srgbClr val="26374B"/>
+                </a:solidFill>
+              </a:rPr>
+              <a:t>The Relationship</a:t>
+            </a:r>
             <a:endParaRPr lang="en-US" dirty="0">
               <a:solidFill>
                 <a:srgbClr val="26374B"/>
@@ -4098,41 +4237,29 @@
           </a:p>
         </p:txBody>
       </p:sp>
-      <p:pic>
-        <p:nvPicPr>
-          <p:cNvPr id="4" name="Content Placeholder 3"/>
-          <p:cNvPicPr>
-            <a:picLocks noGrp="1" noChangeAspect="1"/>
-          </p:cNvPicPr>
+      <p:sp>
+        <p:nvSpPr>
+          <p:cNvPr id="3" name="Content Placeholder 2"/>
+          <p:cNvSpPr>
+            <a:spLocks noGrp="1"/>
+          </p:cNvSpPr>
           <p:nvPr>
             <p:ph idx="1"/>
           </p:nvPr>
-        </p:nvPicPr>
-        <p:blipFill rotWithShape="1">
-          <a:blip r:embed="rId2">
-            <a:extLst>
-              <a:ext uri="{28A0092B-C50C-407E-A947-70E740481C1C}">
-                <a14:useLocalDpi xmlns:a14="http://schemas.microsoft.com/office/drawing/2010/main" val="0"/>
-              </a:ext>
-            </a:extLst>
-          </a:blip>
-          <a:srcRect l="17167" t="26681" r="28184" b="17373"/>
-          <a:stretch/>
-        </p:blipFill>
-        <p:spPr>
-          <a:xfrm>
-            <a:off x="2971800" y="2679701"/>
-            <a:ext cx="3213100" cy="3060700"/>
-          </a:xfrm>
-          <a:prstGeom prst="ellipse">
-            <a:avLst/>
-          </a:prstGeom>
-        </p:spPr>
-      </p:pic>
+        </p:nvSpPr>
+        <p:spPr/>
+        <p:txBody>
+          <a:bodyPr/>
+          <a:lstStyle/>
+          <a:p>
+            <a:endParaRPr lang="en-US"/>
+          </a:p>
+        </p:txBody>
+      </p:sp>
     </p:spTree>
     <p:extLst>
       <p:ext uri="{BB962C8B-B14F-4D97-AF65-F5344CB8AC3E}">
-        <p14:creationId xmlns:p14="http://schemas.microsoft.com/office/powerpoint/2010/main" val="1740466460"/>
+        <p14:creationId xmlns:p14="http://schemas.microsoft.com/office/powerpoint/2010/main" val="1478807115"/>
       </p:ext>
     </p:extLst>
   </p:cSld>
@@ -4176,16 +4303,19 @@
             <p:ph type="title"/>
           </p:nvPr>
         </p:nvSpPr>
-        <p:spPr>
-          <a:xfrm>
-            <a:off x="457200" y="157410"/>
-            <a:ext cx="8229600" cy="1143000"/>
-          </a:xfrm>
-        </p:spPr>
-        <p:txBody>
-          <a:bodyPr/>
-          <a:lstStyle/>
-          <a:p>
+        <p:spPr/>
+        <p:txBody>
+          <a:bodyPr/>
+          <a:lstStyle/>
+          <a:p>
+            <a:r>
+              <a:rPr lang="en-US" dirty="0" smtClean="0">
+                <a:solidFill>
+                  <a:srgbClr val="26374B"/>
+                </a:solidFill>
+              </a:rPr>
+              <a:t>What is Digital Stewardship</a:t>
+            </a:r>
             <a:endParaRPr lang="en-US" dirty="0">
               <a:solidFill>
                 <a:srgbClr val="26374B"/>
@@ -4209,14 +4339,14 @@
           <a:bodyPr/>
           <a:lstStyle/>
           <a:p>
-            <a:endParaRPr lang="en-US" dirty="0"/>
+            <a:endParaRPr lang="en-US"/>
           </a:p>
         </p:txBody>
       </p:sp>
     </p:spTree>
     <p:extLst>
       <p:ext uri="{BB962C8B-B14F-4D97-AF65-F5344CB8AC3E}">
-        <p14:creationId xmlns:p14="http://schemas.microsoft.com/office/powerpoint/2010/main" val="1210504029"/>
+        <p14:creationId xmlns:p14="http://schemas.microsoft.com/office/powerpoint/2010/main" val="2104562194"/>
       </p:ext>
     </p:extLst>
   </p:cSld>
@@ -4260,14 +4390,11 @@
             <p:ph type="title"/>
           </p:nvPr>
         </p:nvSpPr>
-        <p:spPr>
-          <a:xfrm>
-            <a:off x="457200" y="157410"/>
-            <a:ext cx="8229600" cy="1143000"/>
-          </a:xfrm>
-        </p:spPr>
-        <p:txBody>
-          <a:bodyPr/>
+        <p:spPr/>
+        <p:txBody>
+          <a:bodyPr>
+            <a:normAutofit/>
+          </a:bodyPr>
           <a:lstStyle/>
           <a:p>
             <a:r>
@@ -4276,7 +4403,7 @@
                   <a:srgbClr val="26374B"/>
                 </a:solidFill>
               </a:rPr>
-              <a:t>References</a:t>
+              <a:t>Imparting Principles</a:t>
             </a:r>
             <a:endParaRPr lang="en-US" dirty="0">
               <a:solidFill>
@@ -4301,14 +4428,14 @@
           <a:bodyPr/>
           <a:lstStyle/>
           <a:p>
-            <a:endParaRPr lang="en-US" dirty="0"/>
+            <a:endParaRPr lang="en-US"/>
           </a:p>
         </p:txBody>
       </p:sp>
     </p:spTree>
     <p:extLst>
       <p:ext uri="{BB962C8B-B14F-4D97-AF65-F5344CB8AC3E}">
-        <p14:creationId xmlns:p14="http://schemas.microsoft.com/office/powerpoint/2010/main" val="2023121167"/>
+        <p14:creationId xmlns:p14="http://schemas.microsoft.com/office/powerpoint/2010/main" val="946853682"/>
       </p:ext>
     </p:extLst>
   </p:cSld>
@@ -4326,6 +4453,224 @@
 </file>
 
 <file path=ppt/slides/slide6.xml><?xml version="1.0" encoding="utf-8"?>
+<p:sld xmlns:a="http://schemas.openxmlformats.org/drawingml/2006/main" xmlns:r="http://schemas.openxmlformats.org/officeDocument/2006/relationships" xmlns:p="http://schemas.openxmlformats.org/presentationml/2006/main">
+  <p:cSld>
+    <p:spTree>
+      <p:nvGrpSpPr>
+        <p:cNvPr id="1" name=""/>
+        <p:cNvGrpSpPr/>
+        <p:nvPr/>
+      </p:nvGrpSpPr>
+      <p:grpSpPr>
+        <a:xfrm>
+          <a:off x="0" y="0"/>
+          <a:ext cx="0" cy="0"/>
+          <a:chOff x="0" y="0"/>
+          <a:chExt cx="0" cy="0"/>
+        </a:xfrm>
+      </p:grpSpPr>
+      <p:sp>
+        <p:nvSpPr>
+          <p:cNvPr id="2" name="Title 1"/>
+          <p:cNvSpPr>
+            <a:spLocks noGrp="1"/>
+          </p:cNvSpPr>
+          <p:nvPr>
+            <p:ph type="title"/>
+          </p:nvPr>
+        </p:nvSpPr>
+        <p:spPr/>
+        <p:txBody>
+          <a:bodyPr/>
+          <a:lstStyle/>
+          <a:p>
+            <a:r>
+              <a:rPr lang="en-US" dirty="0" smtClean="0">
+                <a:solidFill>
+                  <a:srgbClr val="26374B"/>
+                </a:solidFill>
+              </a:rPr>
+              <a:t>Limitations</a:t>
+            </a:r>
+            <a:endParaRPr lang="en-US" dirty="0">
+              <a:solidFill>
+                <a:srgbClr val="26374B"/>
+              </a:solidFill>
+            </a:endParaRPr>
+          </a:p>
+        </p:txBody>
+      </p:sp>
+      <p:sp>
+        <p:nvSpPr>
+          <p:cNvPr id="3" name="Content Placeholder 2"/>
+          <p:cNvSpPr>
+            <a:spLocks noGrp="1"/>
+          </p:cNvSpPr>
+          <p:nvPr>
+            <p:ph idx="1"/>
+          </p:nvPr>
+        </p:nvSpPr>
+        <p:spPr/>
+        <p:txBody>
+          <a:bodyPr/>
+          <a:lstStyle/>
+          <a:p>
+            <a:endParaRPr lang="en-US"/>
+          </a:p>
+        </p:txBody>
+      </p:sp>
+    </p:spTree>
+    <p:extLst>
+      <p:ext uri="{BB962C8B-B14F-4D97-AF65-F5344CB8AC3E}">
+        <p14:creationId xmlns:p14="http://schemas.microsoft.com/office/powerpoint/2010/main" val="1008870480"/>
+      </p:ext>
+    </p:extLst>
+  </p:cSld>
+  <p:clrMapOvr>
+    <a:masterClrMapping/>
+  </p:clrMapOvr>
+  <p:timing>
+    <p:tnLst>
+      <p:par>
+        <p:cTn id="1" dur="indefinite" restart="never" nodeType="tmRoot"/>
+      </p:par>
+    </p:tnLst>
+  </p:timing>
+</p:sld>
+</file>
+
+<file path=ppt/slides/slide7.xml><?xml version="1.0" encoding="utf-8"?>
+<p:sld xmlns:a="http://schemas.openxmlformats.org/drawingml/2006/main" xmlns:r="http://schemas.openxmlformats.org/officeDocument/2006/relationships" xmlns:p="http://schemas.openxmlformats.org/presentationml/2006/main">
+  <p:cSld>
+    <p:spTree>
+      <p:nvGrpSpPr>
+        <p:cNvPr id="1" name=""/>
+        <p:cNvGrpSpPr/>
+        <p:nvPr/>
+      </p:nvGrpSpPr>
+      <p:grpSpPr>
+        <a:xfrm>
+          <a:off x="0" y="0"/>
+          <a:ext cx="0" cy="0"/>
+          <a:chOff x="0" y="0"/>
+          <a:chExt cx="0" cy="0"/>
+        </a:xfrm>
+      </p:grpSpPr>
+      <p:sp>
+        <p:nvSpPr>
+          <p:cNvPr id="2" name="Title 1"/>
+          <p:cNvSpPr>
+            <a:spLocks noGrp="1"/>
+          </p:cNvSpPr>
+          <p:nvPr>
+            <p:ph type="title"/>
+          </p:nvPr>
+        </p:nvSpPr>
+        <p:spPr>
+          <a:ln>
+            <a:noFill/>
+          </a:ln>
+        </p:spPr>
+        <p:txBody>
+          <a:bodyPr/>
+          <a:lstStyle/>
+          <a:p>
+            <a:r>
+              <a:rPr lang="en-US" dirty="0" smtClean="0">
+                <a:solidFill>
+                  <a:srgbClr val="26374B"/>
+                </a:solidFill>
+              </a:rPr>
+              <a:t>References</a:t>
+            </a:r>
+            <a:endParaRPr lang="en-US" dirty="0">
+              <a:solidFill>
+                <a:srgbClr val="26374B"/>
+              </a:solidFill>
+            </a:endParaRPr>
+          </a:p>
+        </p:txBody>
+      </p:sp>
+      <p:sp>
+        <p:nvSpPr>
+          <p:cNvPr id="3" name="Content Placeholder 2"/>
+          <p:cNvSpPr>
+            <a:spLocks noGrp="1"/>
+          </p:cNvSpPr>
+          <p:nvPr>
+            <p:ph idx="1"/>
+          </p:nvPr>
+        </p:nvSpPr>
+        <p:spPr/>
+        <p:txBody>
+          <a:bodyPr/>
+          <a:lstStyle/>
+          <a:p>
+            <a:r>
+              <a:rPr lang="en-US" dirty="0">
+                <a:solidFill>
+                  <a:srgbClr val="C00000"/>
+                </a:solidFill>
+              </a:rPr>
+              <a:t>DCC (Digital Curation Centre) Curation Lifecycle Model</a:t>
+            </a:r>
+          </a:p>
+          <a:p>
+            <a:r>
+              <a:rPr lang="en-US" dirty="0">
+                <a:solidFill>
+                  <a:srgbClr val="C00000"/>
+                </a:solidFill>
+              </a:rPr>
+              <a:t>Digital Stewardship: The one with all the definitions</a:t>
+            </a:r>
+          </a:p>
+          <a:p>
+            <a:r>
+              <a:rPr lang="en-US" dirty="0">
+                <a:solidFill>
+                  <a:srgbClr val="C00000"/>
+                </a:solidFill>
+              </a:rPr>
+              <a:t>Collaborative Approaches to Teaching Digital Stewardship: Classroom, Laboratory, and </a:t>
+            </a:r>
+            <a:r>
+              <a:rPr lang="en-US" dirty="0" smtClean="0">
+                <a:solidFill>
+                  <a:srgbClr val="C00000"/>
+                </a:solidFill>
+              </a:rPr>
+              <a:t>Internships</a:t>
+            </a:r>
+            <a:endParaRPr lang="en-US" dirty="0">
+              <a:solidFill>
+                <a:srgbClr val="C00000"/>
+              </a:solidFill>
+            </a:endParaRPr>
+          </a:p>
+        </p:txBody>
+      </p:sp>
+    </p:spTree>
+    <p:extLst>
+      <p:ext uri="{BB962C8B-B14F-4D97-AF65-F5344CB8AC3E}">
+        <p14:creationId xmlns:p14="http://schemas.microsoft.com/office/powerpoint/2010/main" val="207083249"/>
+      </p:ext>
+    </p:extLst>
+  </p:cSld>
+  <p:clrMapOvr>
+    <a:masterClrMapping/>
+  </p:clrMapOvr>
+  <p:timing>
+    <p:tnLst>
+      <p:par>
+        <p:cTn id="1" dur="indefinite" restart="never" nodeType="tmRoot"/>
+      </p:par>
+    </p:tnLst>
+  </p:timing>
+</p:sld>
+</file>
+
+<file path=ppt/slides/slide8.xml><?xml version="1.0" encoding="utf-8"?>
 <p:sld xmlns:a="http://schemas.openxmlformats.org/drawingml/2006/main" xmlns:r="http://schemas.openxmlformats.org/officeDocument/2006/relationships" xmlns:p="http://schemas.openxmlformats.org/presentationml/2006/main">
   <p:cSld>
     <p:bg>
@@ -4553,8 +4898,8 @@
         </p:nvSpPr>
         <p:spPr>
           <a:xfrm>
-            <a:off x="218043" y="1829059"/>
-            <a:ext cx="2145492" cy="2178560"/>
+            <a:off x="0" y="1829059"/>
+            <a:ext cx="2363535" cy="2178560"/>
           </a:xfrm>
           <a:prstGeom prst="rect">
             <a:avLst/>
@@ -4746,8 +5091,13 @@
                   <a:srgbClr val="202F3E"/>
                 </a:solidFill>
               </a:rPr>
-              <a:t>Resources</a:t>
-            </a:r>
+              <a:t>DRS Resources</a:t>
+            </a:r>
+            <a:endParaRPr lang="en-US" sz="2700" b="1" i="1" dirty="0" smtClean="0">
+              <a:solidFill>
+                <a:srgbClr val="202F3E"/>
+              </a:solidFill>
+            </a:endParaRPr>
           </a:p>
           <a:p>
             <a:pPr algn="r"/>
@@ -5053,7 +5403,7 @@
 </p:sld>
 </file>
 
-<file path=ppt/slides/slide7.xml><?xml version="1.0" encoding="utf-8"?>
+<file path=ppt/slides/slide9.xml><?xml version="1.0" encoding="utf-8"?>
 <p:sld xmlns:a="http://schemas.openxmlformats.org/drawingml/2006/main" xmlns:r="http://schemas.openxmlformats.org/officeDocument/2006/relationships" xmlns:p="http://schemas.openxmlformats.org/presentationml/2006/main">
   <p:cSld>
     <p:spTree>

</xml_diff>

<commit_message>
Updating PPTX to most recent version
</commit_message>
<xml_diff>
--- a/Presentations/Open Repositories 2016/Digital Stewardship/DigitalStewardship.pptx
+++ b/Presentations/Open Repositories 2016/Digital Stewardship/DigitalStewardship.pptx
@@ -215,7 +215,7 @@
           <a:p>
             <a:fld id="{D9ECFEF1-2E88-E646-A99D-93EC0DB2D22C}" type="datetimeFigureOut">
               <a:rPr lang="en-US" smtClean="0"/>
-              <a:t>6/8/16</a:t>
+              <a:t>6/9/16</a:t>
             </a:fld>
             <a:endParaRPr lang="en-US"/>
           </a:p>
@@ -840,7 +840,7 @@
           <a:p>
             <a:fld id="{C952E0D9-C4C6-B144-92E9-4E0D31DDAA26}" type="datetimeFigureOut">
               <a:rPr lang="en-US" smtClean="0"/>
-              <a:t>6/8/16</a:t>
+              <a:t>6/9/16</a:t>
             </a:fld>
             <a:endParaRPr lang="en-US"/>
           </a:p>
@@ -1010,7 +1010,7 @@
           <a:p>
             <a:fld id="{C952E0D9-C4C6-B144-92E9-4E0D31DDAA26}" type="datetimeFigureOut">
               <a:rPr lang="en-US" smtClean="0"/>
-              <a:t>6/8/16</a:t>
+              <a:t>6/9/16</a:t>
             </a:fld>
             <a:endParaRPr lang="en-US"/>
           </a:p>
@@ -1190,7 +1190,7 @@
           <a:p>
             <a:fld id="{C952E0D9-C4C6-B144-92E9-4E0D31DDAA26}" type="datetimeFigureOut">
               <a:rPr lang="en-US" smtClean="0"/>
-              <a:t>6/8/16</a:t>
+              <a:t>6/9/16</a:t>
             </a:fld>
             <a:endParaRPr lang="en-US"/>
           </a:p>
@@ -1360,7 +1360,7 @@
           <a:p>
             <a:fld id="{C952E0D9-C4C6-B144-92E9-4E0D31DDAA26}" type="datetimeFigureOut">
               <a:rPr lang="en-US" smtClean="0"/>
-              <a:t>6/8/16</a:t>
+              <a:t>6/9/16</a:t>
             </a:fld>
             <a:endParaRPr lang="en-US"/>
           </a:p>
@@ -1606,7 +1606,7 @@
           <a:p>
             <a:fld id="{C952E0D9-C4C6-B144-92E9-4E0D31DDAA26}" type="datetimeFigureOut">
               <a:rPr lang="en-US" smtClean="0"/>
-              <a:t>6/8/16</a:t>
+              <a:t>6/9/16</a:t>
             </a:fld>
             <a:endParaRPr lang="en-US"/>
           </a:p>
@@ -1894,7 +1894,7 @@
           <a:p>
             <a:fld id="{C952E0D9-C4C6-B144-92E9-4E0D31DDAA26}" type="datetimeFigureOut">
               <a:rPr lang="en-US" smtClean="0"/>
-              <a:t>6/8/16</a:t>
+              <a:t>6/9/16</a:t>
             </a:fld>
             <a:endParaRPr lang="en-US"/>
           </a:p>
@@ -2316,7 +2316,7 @@
           <a:p>
             <a:fld id="{C952E0D9-C4C6-B144-92E9-4E0D31DDAA26}" type="datetimeFigureOut">
               <a:rPr lang="en-US" smtClean="0"/>
-              <a:t>6/8/16</a:t>
+              <a:t>6/9/16</a:t>
             </a:fld>
             <a:endParaRPr lang="en-US"/>
           </a:p>
@@ -2434,7 +2434,7 @@
           <a:p>
             <a:fld id="{C952E0D9-C4C6-B144-92E9-4E0D31DDAA26}" type="datetimeFigureOut">
               <a:rPr lang="en-US" smtClean="0"/>
-              <a:t>6/8/16</a:t>
+              <a:t>6/9/16</a:t>
             </a:fld>
             <a:endParaRPr lang="en-US"/>
           </a:p>
@@ -2529,7 +2529,7 @@
           <a:p>
             <a:fld id="{C952E0D9-C4C6-B144-92E9-4E0D31DDAA26}" type="datetimeFigureOut">
               <a:rPr lang="en-US" smtClean="0"/>
-              <a:t>6/8/16</a:t>
+              <a:t>6/9/16</a:t>
             </a:fld>
             <a:endParaRPr lang="en-US"/>
           </a:p>
@@ -2806,7 +2806,7 @@
           <a:p>
             <a:fld id="{C952E0D9-C4C6-B144-92E9-4E0D31DDAA26}" type="datetimeFigureOut">
               <a:rPr lang="en-US" smtClean="0"/>
-              <a:t>6/8/16</a:t>
+              <a:t>6/9/16</a:t>
             </a:fld>
             <a:endParaRPr lang="en-US"/>
           </a:p>
@@ -3063,7 +3063,7 @@
           <a:p>
             <a:fld id="{C952E0D9-C4C6-B144-92E9-4E0D31DDAA26}" type="datetimeFigureOut">
               <a:rPr lang="en-US" smtClean="0"/>
-              <a:t>6/8/16</a:t>
+              <a:t>6/9/16</a:t>
             </a:fld>
             <a:endParaRPr lang="en-US"/>
           </a:p>
@@ -3279,7 +3279,7 @@
           <a:p>
             <a:fld id="{C952E0D9-C4C6-B144-92E9-4E0D31DDAA26}" type="datetimeFigureOut">
               <a:rPr lang="en-US" smtClean="0"/>
-              <a:t>6/8/16</a:t>
+              <a:t>6/9/16</a:t>
             </a:fld>
             <a:endParaRPr lang="en-US"/>
           </a:p>
@@ -3640,6 +3640,14 @@
 <file path=ppt/slides/slide1.xml><?xml version="1.0" encoding="utf-8"?>
 <p:sld xmlns:a="http://schemas.openxmlformats.org/drawingml/2006/main" xmlns:r="http://schemas.openxmlformats.org/officeDocument/2006/relationships" xmlns:p="http://schemas.openxmlformats.org/presentationml/2006/main">
   <p:cSld>
+    <p:bg>
+      <p:bgPr>
+        <a:solidFill>
+          <a:srgbClr val="ECF0F2"/>
+        </a:solidFill>
+        <a:effectLst/>
+      </p:bgPr>
+    </p:bg>
     <p:spTree>
       <p:nvGrpSpPr>
         <p:cNvPr id="1" name=""/>
@@ -3946,6 +3954,14 @@
 <file path=ppt/slides/slide2.xml><?xml version="1.0" encoding="utf-8"?>
 <p:sld xmlns:a="http://schemas.openxmlformats.org/drawingml/2006/main" xmlns:r="http://schemas.openxmlformats.org/officeDocument/2006/relationships" xmlns:p="http://schemas.openxmlformats.org/presentationml/2006/main">
   <p:cSld>
+    <p:bg>
+      <p:bgPr>
+        <a:solidFill>
+          <a:srgbClr val="ECF0F2"/>
+        </a:solidFill>
+        <a:effectLst/>
+      </p:bgPr>
+    </p:bg>
     <p:spTree>
       <p:nvGrpSpPr>
         <p:cNvPr id="1" name=""/>
@@ -4211,6 +4227,14 @@
 <file path=ppt/slides/slide3.xml><?xml version="1.0" encoding="utf-8"?>
 <p:sld xmlns:a="http://schemas.openxmlformats.org/drawingml/2006/main" xmlns:r="http://schemas.openxmlformats.org/officeDocument/2006/relationships" xmlns:p="http://schemas.openxmlformats.org/presentationml/2006/main">
   <p:cSld>
+    <p:bg>
+      <p:bgPr>
+        <a:solidFill>
+          <a:srgbClr val="ECF0F2"/>
+        </a:solidFill>
+        <a:effectLst/>
+      </p:bgPr>
+    </p:bg>
     <p:spTree>
       <p:nvGrpSpPr>
         <p:cNvPr id="1" name=""/>
@@ -4549,6 +4573,14 @@
 <file path=ppt/slides/slide4.xml><?xml version="1.0" encoding="utf-8"?>
 <p:sld xmlns:a="http://schemas.openxmlformats.org/drawingml/2006/main" xmlns:r="http://schemas.openxmlformats.org/officeDocument/2006/relationships" xmlns:p="http://schemas.openxmlformats.org/presentationml/2006/main">
   <p:cSld>
+    <p:bg>
+      <p:bgPr>
+        <a:solidFill>
+          <a:srgbClr val="ECF0F2"/>
+        </a:solidFill>
+        <a:effectLst/>
+      </p:bgPr>
+    </p:bg>
     <p:spTree>
       <p:nvGrpSpPr>
         <p:cNvPr id="1" name=""/>
@@ -4588,7 +4620,7 @@
                   <a:srgbClr val="26374B"/>
                 </a:solidFill>
               </a:rPr>
-              <a:t>The Relationship</a:t>
+              <a:t>Stewarding</a:t>
             </a:r>
             <a:endParaRPr lang="en-US" dirty="0">
               <a:solidFill>
@@ -4764,6 +4796,14 @@
 <file path=ppt/slides/slide5.xml><?xml version="1.0" encoding="utf-8"?>
 <p:sld xmlns:a="http://schemas.openxmlformats.org/drawingml/2006/main" xmlns:r="http://schemas.openxmlformats.org/officeDocument/2006/relationships" xmlns:p="http://schemas.openxmlformats.org/presentationml/2006/main">
   <p:cSld>
+    <p:bg>
+      <p:bgPr>
+        <a:solidFill>
+          <a:srgbClr val="ECF0F2"/>
+        </a:solidFill>
+        <a:effectLst/>
+      </p:bgPr>
+    </p:bg>
     <p:spTree>
       <p:nvGrpSpPr>
         <p:cNvPr id="1" name=""/>
@@ -4801,7 +4841,7 @@
                   <a:srgbClr val="26374B"/>
                 </a:solidFill>
               </a:rPr>
-              <a:t>Imparting Principles</a:t>
+              <a:t>Facilitating Stewardship</a:t>
             </a:r>
             <a:endParaRPr lang="en-US" dirty="0">
               <a:solidFill>
@@ -4940,6 +4980,14 @@
 <file path=ppt/slides/slide6.xml><?xml version="1.0" encoding="utf-8"?>
 <p:sld xmlns:a="http://schemas.openxmlformats.org/drawingml/2006/main" xmlns:r="http://schemas.openxmlformats.org/officeDocument/2006/relationships" xmlns:p="http://schemas.openxmlformats.org/presentationml/2006/main">
   <p:cSld>
+    <p:bg>
+      <p:bgPr>
+        <a:solidFill>
+          <a:srgbClr val="ECF0F2"/>
+        </a:solidFill>
+        <a:effectLst/>
+      </p:bgPr>
+    </p:bg>
     <p:spTree>
       <p:nvGrpSpPr>
         <p:cNvPr id="1" name=""/>
@@ -4972,14 +5020,14 @@
             <a:r>
               <a:rPr lang="en-US" dirty="0" smtClean="0">
                 <a:solidFill>
-                  <a:srgbClr val="C00000"/>
-                </a:solidFill>
-              </a:rPr>
-              <a:t>Conclusion</a:t>
+                  <a:srgbClr val="26374B"/>
+                </a:solidFill>
+              </a:rPr>
+              <a:t>Encouraging Stewardship</a:t>
             </a:r>
             <a:endParaRPr lang="en-US" dirty="0">
               <a:solidFill>
-                <a:srgbClr val="C00000"/>
+                <a:srgbClr val="26374B"/>
               </a:solidFill>
             </a:endParaRPr>
           </a:p>
@@ -5138,7 +5186,7 @@
     <p:bg>
       <p:bgPr>
         <a:solidFill>
-          <a:srgbClr val="E8EEED"/>
+          <a:srgbClr val="ECF0F2"/>
         </a:solidFill>
         <a:effectLst/>
       </p:bgPr>
@@ -5918,6 +5966,14 @@
 <file path=ppt/slides/slide8.xml><?xml version="1.0" encoding="utf-8"?>
 <p:sld xmlns:a="http://schemas.openxmlformats.org/drawingml/2006/main" xmlns:r="http://schemas.openxmlformats.org/officeDocument/2006/relationships" xmlns:p="http://schemas.openxmlformats.org/presentationml/2006/main">
   <p:cSld>
+    <p:bg>
+      <p:bgPr>
+        <a:solidFill>
+          <a:srgbClr val="ECF0F2"/>
+        </a:solidFill>
+        <a:effectLst/>
+      </p:bgPr>
+    </p:bg>
     <p:spTree>
       <p:nvGrpSpPr>
         <p:cNvPr id="1" name=""/>

</xml_diff>

<commit_message>
Adding text to slides
</commit_message>
<xml_diff>
--- a/Presentations/Open Repositories 2016/Digital Stewardship/DigitalStewardship.pptx
+++ b/Presentations/Open Repositories 2016/Digital Stewardship/DigitalStewardship.pptx
@@ -527,9 +527,45 @@
           <a:bodyPr/>
           <a:lstStyle/>
           <a:p>
-            <a:r>
-              <a:rPr lang="en-US" dirty="0" smtClean="0"/>
-              <a:t>Promotional Slide</a:t>
+            <a:pPr rtl="0"/>
+            <a:r>
+              <a:rPr lang="en-US" sz="1200" b="0" i="0" u="none" strike="noStrike" kern="1200" dirty="0" smtClean="0">
+                <a:solidFill>
+                  <a:schemeClr val="tx1"/>
+                </a:solidFill>
+                <a:effectLst/>
+                <a:latin typeface="+mn-lt"/>
+                <a:ea typeface="+mn-ea"/>
+                <a:cs typeface="+mn-cs"/>
+              </a:rPr>
+              <a:t>Good afternoon everyone. My name is Sarah Sweeney and I am the Digital Repository Manager for Northeastern University Libraries. I am part of our library’s Digital Scholarship Group and I am going use my seven minutes to rave about the incredible opportunity we have when working with repository users to help them solve their digital asset storage problems to also teach them about good digital stewardship practices. </a:t>
+            </a:r>
+          </a:p>
+          <a:p>
+            <a:pPr rtl="0"/>
+            <a:endParaRPr lang="en-US" sz="1200" b="0" i="0" u="none" strike="noStrike" kern="1200" dirty="0" smtClean="0">
+              <a:solidFill>
+                <a:schemeClr val="tx1"/>
+              </a:solidFill>
+              <a:effectLst/>
+              <a:latin typeface="+mn-lt"/>
+              <a:ea typeface="+mn-ea"/>
+              <a:cs typeface="+mn-cs"/>
+            </a:endParaRPr>
+          </a:p>
+          <a:p>
+            <a:pPr rtl="0"/>
+            <a:r>
+              <a:rPr lang="en-US" sz="1200" b="0" i="0" u="none" strike="noStrike" kern="1200" dirty="0" smtClean="0">
+                <a:solidFill>
+                  <a:schemeClr val="tx1"/>
+                </a:solidFill>
+                <a:effectLst/>
+                <a:latin typeface="+mn-lt"/>
+                <a:ea typeface="+mn-ea"/>
+                <a:cs typeface="+mn-cs"/>
+              </a:rPr>
+              <a:t>If you’re not talking about good digital stewardship practices with your repository users, I want to encourage you to think about what you can do to help strengthen your users’ stewardship skills and work towards the mutual goal of creating more robust and stable digital projects.</a:t>
             </a:r>
             <a:endParaRPr lang="en-US" dirty="0"/>
           </a:p>
@@ -572,6 +608,643 @@
 </file>
 
 <file path=ppt/notesSlides/notesSlide2.xml><?xml version="1.0" encoding="utf-8"?>
+<p:notes xmlns:a="http://schemas.openxmlformats.org/drawingml/2006/main" xmlns:r="http://schemas.openxmlformats.org/officeDocument/2006/relationships" xmlns:p="http://schemas.openxmlformats.org/presentationml/2006/main">
+  <p:cSld>
+    <p:spTree>
+      <p:nvGrpSpPr>
+        <p:cNvPr id="1" name=""/>
+        <p:cNvGrpSpPr/>
+        <p:nvPr/>
+      </p:nvGrpSpPr>
+      <p:grpSpPr>
+        <a:xfrm>
+          <a:off x="0" y="0"/>
+          <a:ext cx="0" cy="0"/>
+          <a:chOff x="0" y="0"/>
+          <a:chExt cx="0" cy="0"/>
+        </a:xfrm>
+      </p:grpSpPr>
+      <p:sp>
+        <p:nvSpPr>
+          <p:cNvPr id="2" name="Slide Image Placeholder 1"/>
+          <p:cNvSpPr>
+            <a:spLocks noGrp="1" noRot="1" noChangeAspect="1"/>
+          </p:cNvSpPr>
+          <p:nvPr>
+            <p:ph type="sldImg"/>
+          </p:nvPr>
+        </p:nvSpPr>
+        <p:spPr/>
+      </p:sp>
+      <p:sp>
+        <p:nvSpPr>
+          <p:cNvPr id="3" name="Notes Placeholder 2"/>
+          <p:cNvSpPr>
+            <a:spLocks noGrp="1"/>
+          </p:cNvSpPr>
+          <p:nvPr>
+            <p:ph type="body" idx="1"/>
+          </p:nvPr>
+        </p:nvSpPr>
+        <p:spPr/>
+        <p:txBody>
+          <a:bodyPr/>
+          <a:lstStyle/>
+          <a:p>
+            <a:r>
+              <a:rPr lang="en-US" dirty="0" smtClean="0"/>
+              <a:t>Digital stewardship, digital curation, and digital preservation are sometimes used interchangeably, correctly or incorrectly depending on the context. During her National Digital Stewardship Residency at the Folger Shakespeare Library, Jaime McCurry described digital stewardship as encompassing …. “all activities related to the care and management of digital objects over time. Proper digital stewardship addresses all phases of the digital object lifecycle: from digital asset conception, creation, appraisal, description, and preservation, to accessibility, reuse, and beyond.”</a:t>
+            </a:r>
+          </a:p>
+          <a:p>
+            <a:endParaRPr lang="en-US" dirty="0" smtClean="0"/>
+          </a:p>
+          <a:p>
+            <a:r>
+              <a:rPr lang="en-US" dirty="0" smtClean="0"/>
+              <a:t>Similar to Jamie’s definition, for the purposes of this presentation I’m using the term digital stewardship to describe the practice of creating, storing, sharing, and protecting digital objects of any kind to ensure long-term usability. </a:t>
+            </a:r>
+          </a:p>
+          <a:p>
+            <a:endParaRPr lang="en-US" dirty="0" smtClean="0"/>
+          </a:p>
+          <a:p>
+            <a:r>
+              <a:rPr lang="en-US" dirty="0" smtClean="0"/>
+              <a:t>For most repository users, digital preservation often means relying on others to provide the appropriate technical infrastructure, so I’m going to stop short of raving about inserting preservation practices into our discussions with users. </a:t>
+            </a:r>
+            <a:endParaRPr lang="en-US" dirty="0"/>
+          </a:p>
+        </p:txBody>
+      </p:sp>
+      <p:sp>
+        <p:nvSpPr>
+          <p:cNvPr id="4" name="Slide Number Placeholder 3"/>
+          <p:cNvSpPr>
+            <a:spLocks noGrp="1"/>
+          </p:cNvSpPr>
+          <p:nvPr>
+            <p:ph type="sldNum" sz="quarter" idx="10"/>
+          </p:nvPr>
+        </p:nvSpPr>
+        <p:spPr/>
+        <p:txBody>
+          <a:bodyPr/>
+          <a:lstStyle/>
+          <a:p>
+            <a:fld id="{AA827EB0-AEEB-C744-BAD0-812E2F8A9F84}" type="slidenum">
+              <a:rPr lang="en-US" smtClean="0"/>
+              <a:t>2</a:t>
+            </a:fld>
+            <a:endParaRPr lang="en-US"/>
+          </a:p>
+        </p:txBody>
+      </p:sp>
+    </p:spTree>
+    <p:extLst>
+      <p:ext uri="{BB962C8B-B14F-4D97-AF65-F5344CB8AC3E}">
+        <p14:creationId xmlns:p14="http://schemas.microsoft.com/office/powerpoint/2010/main" val="60758658"/>
+      </p:ext>
+    </p:extLst>
+  </p:cSld>
+  <p:clrMapOvr>
+    <a:masterClrMapping/>
+  </p:clrMapOvr>
+</p:notes>
+</file>
+
+<file path=ppt/notesSlides/notesSlide3.xml><?xml version="1.0" encoding="utf-8"?>
+<p:notes xmlns:a="http://schemas.openxmlformats.org/drawingml/2006/main" xmlns:r="http://schemas.openxmlformats.org/officeDocument/2006/relationships" xmlns:p="http://schemas.openxmlformats.org/presentationml/2006/main">
+  <p:cSld>
+    <p:spTree>
+      <p:nvGrpSpPr>
+        <p:cNvPr id="1" name=""/>
+        <p:cNvGrpSpPr/>
+        <p:nvPr/>
+      </p:nvGrpSpPr>
+      <p:grpSpPr>
+        <a:xfrm>
+          <a:off x="0" y="0"/>
+          <a:ext cx="0" cy="0"/>
+          <a:chOff x="0" y="0"/>
+          <a:chExt cx="0" cy="0"/>
+        </a:xfrm>
+      </p:grpSpPr>
+      <p:sp>
+        <p:nvSpPr>
+          <p:cNvPr id="2" name="Slide Image Placeholder 1"/>
+          <p:cNvSpPr>
+            <a:spLocks noGrp="1" noRot="1" noChangeAspect="1"/>
+          </p:cNvSpPr>
+          <p:nvPr>
+            <p:ph type="sldImg"/>
+          </p:nvPr>
+        </p:nvSpPr>
+        <p:spPr/>
+      </p:sp>
+      <p:sp>
+        <p:nvSpPr>
+          <p:cNvPr id="3" name="Notes Placeholder 2"/>
+          <p:cNvSpPr>
+            <a:spLocks noGrp="1"/>
+          </p:cNvSpPr>
+          <p:nvPr>
+            <p:ph type="body" idx="1"/>
+          </p:nvPr>
+        </p:nvSpPr>
+        <p:spPr/>
+        <p:txBody>
+          <a:bodyPr/>
+          <a:lstStyle/>
+          <a:p>
+            <a:r>
+              <a:rPr lang="en-US" dirty="0" smtClean="0"/>
+              <a:t>Digital stewardship in action: The Digital Curation Centre nicely, and with some complexity, illustrates the lifecycle of digital materials using this handy “Journey to the Center of the Earth”-like diagram.</a:t>
+            </a:r>
+          </a:p>
+          <a:p>
+            <a:endParaRPr lang="en-US" dirty="0" smtClean="0"/>
+          </a:p>
+          <a:p>
+            <a:r>
+              <a:rPr lang="en-US" dirty="0" smtClean="0"/>
+              <a:t>Using DCC’s illustration as a model, we can identify four basic stewardship and curation actions: plan, collect, describe, and maintain.</a:t>
+            </a:r>
+          </a:p>
+          <a:p>
+            <a:endParaRPr lang="en-US" dirty="0" smtClean="0"/>
+          </a:p>
+          <a:p>
+            <a:r>
+              <a:rPr lang="en-US" dirty="0" smtClean="0"/>
+              <a:t>Before and as you create or collect digital materials, you should plan ahead for the management of those materials.</a:t>
+            </a:r>
+          </a:p>
+          <a:p>
+            <a:endParaRPr lang="en-US" dirty="0" smtClean="0"/>
+          </a:p>
+          <a:p>
+            <a:r>
+              <a:rPr lang="en-US" dirty="0" smtClean="0"/>
+              <a:t>Whether you create or collect digital materials, you should do so methodically, creating or collecting metadata as you gather your materials.</a:t>
+            </a:r>
+          </a:p>
+          <a:p>
+            <a:endParaRPr lang="en-US" dirty="0" smtClean="0"/>
+          </a:p>
+          <a:p>
+            <a:r>
+              <a:rPr lang="en-US" dirty="0" smtClean="0"/>
+              <a:t>You should create and store as much metadata as possible about your digital materials, including descriptive, administrative, technical, and preservation metadata, using appropriate standards, and applying metadata consistently, if possible. Make sure your digital materials are clearly identified, and the system you use to organize those materials can be used by others.</a:t>
+            </a:r>
+          </a:p>
+          <a:p>
+            <a:endParaRPr lang="en-US" dirty="0" smtClean="0"/>
+          </a:p>
+          <a:p>
+            <a:r>
+              <a:rPr lang="en-US" dirty="0" smtClean="0"/>
+              <a:t>Be selective about the digital materials you collect. Carefully evaluate what materials require long-term maintenance and what can be weeded, and not just retained for retention’s sake.</a:t>
+            </a:r>
+          </a:p>
+          <a:p>
+            <a:endParaRPr lang="en-US" dirty="0" smtClean="0"/>
+          </a:p>
+          <a:p>
+            <a:r>
+              <a:rPr lang="en-US" dirty="0" smtClean="0"/>
+              <a:t>Even though this model is complex, I think it’s important to note, as the DCC does, that digital curation can be employed in varying degrees, and we and our repository users don’t need to fully implement every best practice to be good caretakers of our digital materials. Digital stewardship and curation practices can be applied in any environment by anyone responsible for the well-being of digital materials.</a:t>
+            </a:r>
+            <a:endParaRPr lang="en-US" dirty="0"/>
+          </a:p>
+        </p:txBody>
+      </p:sp>
+      <p:sp>
+        <p:nvSpPr>
+          <p:cNvPr id="4" name="Slide Number Placeholder 3"/>
+          <p:cNvSpPr>
+            <a:spLocks noGrp="1"/>
+          </p:cNvSpPr>
+          <p:nvPr>
+            <p:ph type="sldNum" sz="quarter" idx="10"/>
+          </p:nvPr>
+        </p:nvSpPr>
+        <p:spPr/>
+        <p:txBody>
+          <a:bodyPr/>
+          <a:lstStyle/>
+          <a:p>
+            <a:fld id="{AA827EB0-AEEB-C744-BAD0-812E2F8A9F84}" type="slidenum">
+              <a:rPr lang="en-US" smtClean="0"/>
+              <a:t>3</a:t>
+            </a:fld>
+            <a:endParaRPr lang="en-US"/>
+          </a:p>
+        </p:txBody>
+      </p:sp>
+    </p:spTree>
+    <p:extLst>
+      <p:ext uri="{BB962C8B-B14F-4D97-AF65-F5344CB8AC3E}">
+        <p14:creationId xmlns:p14="http://schemas.microsoft.com/office/powerpoint/2010/main" val="797856306"/>
+      </p:ext>
+    </p:extLst>
+  </p:cSld>
+  <p:clrMapOvr>
+    <a:masterClrMapping/>
+  </p:clrMapOvr>
+</p:notes>
+</file>
+
+<file path=ppt/notesSlides/notesSlide4.xml><?xml version="1.0" encoding="utf-8"?>
+<p:notes xmlns:a="http://schemas.openxmlformats.org/drawingml/2006/main" xmlns:r="http://schemas.openxmlformats.org/officeDocument/2006/relationships" xmlns:p="http://schemas.openxmlformats.org/presentationml/2006/main">
+  <p:cSld>
+    <p:spTree>
+      <p:nvGrpSpPr>
+        <p:cNvPr id="1" name=""/>
+        <p:cNvGrpSpPr/>
+        <p:nvPr/>
+      </p:nvGrpSpPr>
+      <p:grpSpPr>
+        <a:xfrm>
+          <a:off x="0" y="0"/>
+          <a:ext cx="0" cy="0"/>
+          <a:chOff x="0" y="0"/>
+          <a:chExt cx="0" cy="0"/>
+        </a:xfrm>
+      </p:grpSpPr>
+      <p:sp>
+        <p:nvSpPr>
+          <p:cNvPr id="2" name="Slide Image Placeholder 1"/>
+          <p:cNvSpPr>
+            <a:spLocks noGrp="1" noRot="1" noChangeAspect="1"/>
+          </p:cNvSpPr>
+          <p:nvPr>
+            <p:ph type="sldImg"/>
+          </p:nvPr>
+        </p:nvSpPr>
+        <p:spPr/>
+      </p:sp>
+      <p:sp>
+        <p:nvSpPr>
+          <p:cNvPr id="3" name="Notes Placeholder 2"/>
+          <p:cNvSpPr>
+            <a:spLocks noGrp="1"/>
+          </p:cNvSpPr>
+          <p:nvPr>
+            <p:ph type="body" idx="1"/>
+          </p:nvPr>
+        </p:nvSpPr>
+        <p:spPr/>
+        <p:txBody>
+          <a:bodyPr/>
+          <a:lstStyle/>
+          <a:p>
+            <a:r>
+              <a:rPr lang="en-US" dirty="0" smtClean="0"/>
+              <a:t>So what does it mean to be a steward of digital materials? A digital steward can be can be both an actor and a facilitator. As a repository manager, I spend most of my time as an actor, working to plan, collect, describe, and maintain digital materials on behalf of others. But I, and others in our Digital Scholarship Group, often act as facilitators of good digital stewardship practices.</a:t>
+            </a:r>
+          </a:p>
+          <a:p>
+            <a:endParaRPr lang="en-US" dirty="0" smtClean="0"/>
+          </a:p>
+          <a:p>
+            <a:r>
+              <a:rPr lang="en-US" dirty="0" smtClean="0"/>
+              <a:t>In our library we encounter a lot of university staff and faculty with digital materials they need to store, use, and share. They often come to us with a problem: they have been struggling to manage some sort of digital project, from research data to departmental photography. The materials are precariously stored on an individual’s hard drive, they may have had a close call with losing materials, or they may have experienced staff turnover and want to make sure future staff changes don’t disrupt their project or digital materials.</a:t>
+            </a:r>
+          </a:p>
+          <a:p>
+            <a:endParaRPr lang="en-US" dirty="0" smtClean="0"/>
+          </a:p>
+          <a:p>
+            <a:r>
+              <a:rPr lang="en-US" dirty="0" smtClean="0"/>
+              <a:t>Our working relationships with faculty, researchers, and project teams start because we offer them a solution to their problems: secure repository storage for their digital materials. As we build this relationship, we discuss all the benefits of using a repository to store and share their materials. The advantages usually outweigh the disadvantages and we work together to ingest their files and setup a workflow for their research group, office, or department. </a:t>
+            </a:r>
+          </a:p>
+          <a:p>
+            <a:endParaRPr lang="en-US" dirty="0" smtClean="0"/>
+          </a:p>
+          <a:p>
+            <a:r>
+              <a:rPr lang="en-US" dirty="0" smtClean="0"/>
+              <a:t>As our working relationship develops and we work to ingest their materials and setup workflows, we also take to time to learn about their work and about their practices. We discuss the details of their work, their project needs, and the project’s history. We gather what we learn and use that knowledge to offer them assistance with their project however we can. </a:t>
+            </a:r>
+            <a:endParaRPr lang="en-US" dirty="0"/>
+          </a:p>
+        </p:txBody>
+      </p:sp>
+      <p:sp>
+        <p:nvSpPr>
+          <p:cNvPr id="4" name="Slide Number Placeholder 3"/>
+          <p:cNvSpPr>
+            <a:spLocks noGrp="1"/>
+          </p:cNvSpPr>
+          <p:nvPr>
+            <p:ph type="sldNum" sz="quarter" idx="10"/>
+          </p:nvPr>
+        </p:nvSpPr>
+        <p:spPr/>
+        <p:txBody>
+          <a:bodyPr/>
+          <a:lstStyle/>
+          <a:p>
+            <a:fld id="{AA827EB0-AEEB-C744-BAD0-812E2F8A9F84}" type="slidenum">
+              <a:rPr lang="en-US" smtClean="0"/>
+              <a:t>4</a:t>
+            </a:fld>
+            <a:endParaRPr lang="en-US"/>
+          </a:p>
+        </p:txBody>
+      </p:sp>
+    </p:spTree>
+    <p:extLst>
+      <p:ext uri="{BB962C8B-B14F-4D97-AF65-F5344CB8AC3E}">
+        <p14:creationId xmlns:p14="http://schemas.microsoft.com/office/powerpoint/2010/main" val="850541180"/>
+      </p:ext>
+    </p:extLst>
+  </p:cSld>
+  <p:clrMapOvr>
+    <a:masterClrMapping/>
+  </p:clrMapOvr>
+</p:notes>
+</file>
+
+<file path=ppt/notesSlides/notesSlide5.xml><?xml version="1.0" encoding="utf-8"?>
+<p:notes xmlns:a="http://schemas.openxmlformats.org/drawingml/2006/main" xmlns:r="http://schemas.openxmlformats.org/officeDocument/2006/relationships" xmlns:p="http://schemas.openxmlformats.org/presentationml/2006/main">
+  <p:cSld>
+    <p:spTree>
+      <p:nvGrpSpPr>
+        <p:cNvPr id="1" name=""/>
+        <p:cNvGrpSpPr/>
+        <p:nvPr/>
+      </p:nvGrpSpPr>
+      <p:grpSpPr>
+        <a:xfrm>
+          <a:off x="0" y="0"/>
+          <a:ext cx="0" cy="0"/>
+          <a:chOff x="0" y="0"/>
+          <a:chExt cx="0" cy="0"/>
+        </a:xfrm>
+      </p:grpSpPr>
+      <p:sp>
+        <p:nvSpPr>
+          <p:cNvPr id="2" name="Slide Image Placeholder 1"/>
+          <p:cNvSpPr>
+            <a:spLocks noGrp="1" noRot="1" noChangeAspect="1"/>
+          </p:cNvSpPr>
+          <p:nvPr>
+            <p:ph type="sldImg"/>
+          </p:nvPr>
+        </p:nvSpPr>
+        <p:spPr/>
+      </p:sp>
+      <p:sp>
+        <p:nvSpPr>
+          <p:cNvPr id="3" name="Notes Placeholder 2"/>
+          <p:cNvSpPr>
+            <a:spLocks noGrp="1"/>
+          </p:cNvSpPr>
+          <p:nvPr>
+            <p:ph type="body" idx="1"/>
+          </p:nvPr>
+        </p:nvSpPr>
+        <p:spPr/>
+        <p:txBody>
+          <a:bodyPr/>
+          <a:lstStyle/>
+          <a:p>
+            <a:r>
+              <a:rPr lang="en-US" dirty="0" smtClean="0"/>
+              <a:t>It’s at this point in the relationship we tend to move from actors to facilitators. As we learn about the elements of their project, we actively listen for how they plan to manage their digital materials. As the conversation evolves, we discuss what it means to use the repository as a digital storage tool, and we, sometimes without realizing it, pivot into what it means to care for and maintain digital materials. We learn about how they are collecting or creating their materials, and how those materials are currently stored. We learn about how they are organizing their materials, and, if they are generating metadata, how those objects are being described. We also learn about how they are managing all of their materials, all of which informs the digital stewardship discussion:</a:t>
+            </a:r>
+          </a:p>
+          <a:p>
+            <a:endParaRPr lang="en-US" dirty="0" smtClean="0"/>
+          </a:p>
+          <a:p>
+            <a:pPr marL="171450" indent="-171450">
+              <a:buFont typeface="Arial" charset="0"/>
+              <a:buChar char="•"/>
+            </a:pPr>
+            <a:r>
+              <a:rPr lang="en-US" dirty="0" smtClean="0"/>
+              <a:t>Your project is active and evolving? Let’s talk about version control. </a:t>
+            </a:r>
+          </a:p>
+          <a:p>
+            <a:pPr marL="171450" indent="-171450">
+              <a:buFont typeface="Arial" charset="0"/>
+              <a:buChar char="•"/>
+            </a:pPr>
+            <a:r>
+              <a:rPr lang="en-US" dirty="0" smtClean="0"/>
+              <a:t>Project files are disorganized and confusing? Let’s talk about documentation, codebooks, and file naming conventions. </a:t>
+            </a:r>
+          </a:p>
+          <a:p>
+            <a:pPr marL="171450" indent="-171450">
+              <a:buFont typeface="Arial" charset="0"/>
+              <a:buChar char="•"/>
+            </a:pPr>
+            <a:r>
+              <a:rPr lang="en-US" dirty="0" smtClean="0"/>
+              <a:t>Old files are obsolete? Let’s talk about open file types and migration. </a:t>
+            </a:r>
+          </a:p>
+          <a:p>
+            <a:pPr marL="171450" indent="-171450">
+              <a:buFont typeface="Arial" charset="0"/>
+              <a:buChar char="•"/>
+            </a:pPr>
+            <a:r>
+              <a:rPr lang="en-US" dirty="0" smtClean="0"/>
+              <a:t>We talk about how files will be used by their users and how providing detailed descriptive metadata can be used to increase discovery and access. </a:t>
+            </a:r>
+          </a:p>
+          <a:p>
+            <a:pPr marL="171450" indent="-171450">
+              <a:buFont typeface="Arial" charset="0"/>
+              <a:buChar char="•"/>
+            </a:pPr>
+            <a:r>
+              <a:rPr lang="en-US" dirty="0" smtClean="0"/>
+              <a:t>We talk about file access, use statements, and rights management. </a:t>
+            </a:r>
+          </a:p>
+          <a:p>
+            <a:pPr marL="171450" indent="-171450">
+              <a:buFont typeface="Arial" charset="0"/>
+              <a:buChar char="•"/>
+            </a:pPr>
+            <a:r>
+              <a:rPr lang="en-US" dirty="0" smtClean="0"/>
+              <a:t>We talk about long term management of their data and data management plans. </a:t>
+            </a:r>
+          </a:p>
+          <a:p>
+            <a:pPr marL="0" indent="0">
+              <a:buFont typeface="Arial" charset="0"/>
+              <a:buNone/>
+            </a:pPr>
+            <a:endParaRPr lang="en-US" dirty="0" smtClean="0"/>
+          </a:p>
+          <a:p>
+            <a:pPr marL="0" indent="0">
+              <a:buFont typeface="Arial" charset="0"/>
+              <a:buNone/>
+            </a:pPr>
+            <a:r>
+              <a:rPr lang="en-US" dirty="0" smtClean="0"/>
+              <a:t>In these conversations we are using the repository and its workflows as a frame for digital stewardship concepts that otherwise seem tedious or overwhelming. The benefit of this is that we can encourage repository users to be stewards of their own digital materials without ever saying the words digital stewardship or digital curation.</a:t>
+            </a:r>
+            <a:endParaRPr lang="en-US" dirty="0"/>
+          </a:p>
+        </p:txBody>
+      </p:sp>
+      <p:sp>
+        <p:nvSpPr>
+          <p:cNvPr id="4" name="Slide Number Placeholder 3"/>
+          <p:cNvSpPr>
+            <a:spLocks noGrp="1"/>
+          </p:cNvSpPr>
+          <p:nvPr>
+            <p:ph type="sldNum" sz="quarter" idx="10"/>
+          </p:nvPr>
+        </p:nvSpPr>
+        <p:spPr/>
+        <p:txBody>
+          <a:bodyPr/>
+          <a:lstStyle/>
+          <a:p>
+            <a:fld id="{AA827EB0-AEEB-C744-BAD0-812E2F8A9F84}" type="slidenum">
+              <a:rPr lang="en-US" smtClean="0"/>
+              <a:t>5</a:t>
+            </a:fld>
+            <a:endParaRPr lang="en-US"/>
+          </a:p>
+        </p:txBody>
+      </p:sp>
+    </p:spTree>
+    <p:extLst>
+      <p:ext uri="{BB962C8B-B14F-4D97-AF65-F5344CB8AC3E}">
+        <p14:creationId xmlns:p14="http://schemas.microsoft.com/office/powerpoint/2010/main" val="1398288314"/>
+      </p:ext>
+    </p:extLst>
+  </p:cSld>
+  <p:clrMapOvr>
+    <a:masterClrMapping/>
+  </p:clrMapOvr>
+</p:notes>
+</file>
+
+<file path=ppt/notesSlides/notesSlide6.xml><?xml version="1.0" encoding="utf-8"?>
+<p:notes xmlns:a="http://schemas.openxmlformats.org/drawingml/2006/main" xmlns:r="http://schemas.openxmlformats.org/officeDocument/2006/relationships" xmlns:p="http://schemas.openxmlformats.org/presentationml/2006/main">
+  <p:cSld>
+    <p:spTree>
+      <p:nvGrpSpPr>
+        <p:cNvPr id="1" name=""/>
+        <p:cNvGrpSpPr/>
+        <p:nvPr/>
+      </p:nvGrpSpPr>
+      <p:grpSpPr>
+        <a:xfrm>
+          <a:off x="0" y="0"/>
+          <a:ext cx="0" cy="0"/>
+          <a:chOff x="0" y="0"/>
+          <a:chExt cx="0" cy="0"/>
+        </a:xfrm>
+      </p:grpSpPr>
+      <p:sp>
+        <p:nvSpPr>
+          <p:cNvPr id="2" name="Slide Image Placeholder 1"/>
+          <p:cNvSpPr>
+            <a:spLocks noGrp="1" noRot="1" noChangeAspect="1"/>
+          </p:cNvSpPr>
+          <p:nvPr>
+            <p:ph type="sldImg"/>
+          </p:nvPr>
+        </p:nvSpPr>
+        <p:spPr/>
+      </p:sp>
+      <p:sp>
+        <p:nvSpPr>
+          <p:cNvPr id="3" name="Notes Placeholder 2"/>
+          <p:cNvSpPr>
+            <a:spLocks noGrp="1"/>
+          </p:cNvSpPr>
+          <p:nvPr>
+            <p:ph type="body" idx="1"/>
+          </p:nvPr>
+        </p:nvSpPr>
+        <p:spPr/>
+        <p:txBody>
+          <a:bodyPr/>
+          <a:lstStyle/>
+          <a:p>
+            <a:r>
+              <a:rPr lang="en-US" sz="1200" dirty="0" smtClean="0"/>
+              <a:t>That’s not to say that we as repository staff have all the answers about digital stewardship; in fact, many of us are learning about best practices on the fly. Our library’s digital scholarship and repository staff rarely set out with a checklist of digital stewardship principles to discuss with our users. Rather, we take advantage of the opportunity we have when helping repository users to teach them about digital stewardship, while also attempting to make their lives easier.</a:t>
+            </a:r>
+          </a:p>
+          <a:p>
+            <a:endParaRPr lang="en-US" sz="1200" dirty="0" smtClean="0"/>
+          </a:p>
+          <a:p>
+            <a:r>
+              <a:rPr lang="en-US" sz="1200" dirty="0" smtClean="0"/>
+              <a:t>By inserting these best practices into the discussions we are already having when we work with users, I think we have the opportunity to improve the quality of digital collections stored in our repositories and improve access to scholarly and cultural heritage collections.</a:t>
+            </a:r>
+          </a:p>
+          <a:p>
+            <a:endParaRPr lang="en-US" sz="1200" dirty="0" smtClean="0"/>
+          </a:p>
+          <a:p>
+            <a:r>
+              <a:rPr lang="en-US" sz="1200" dirty="0" smtClean="0"/>
+              <a:t>I encourage you all to think about the relationships you have with stewards of digital materials, to listen to their experiences, and encourage them to insert digital stewardship best practices into their own work. Thank you.</a:t>
+            </a:r>
+            <a:endParaRPr lang="en-US" sz="1200" dirty="0"/>
+          </a:p>
+        </p:txBody>
+      </p:sp>
+      <p:sp>
+        <p:nvSpPr>
+          <p:cNvPr id="4" name="Slide Number Placeholder 3"/>
+          <p:cNvSpPr>
+            <a:spLocks noGrp="1"/>
+          </p:cNvSpPr>
+          <p:nvPr>
+            <p:ph type="sldNum" sz="quarter" idx="10"/>
+          </p:nvPr>
+        </p:nvSpPr>
+        <p:spPr/>
+        <p:txBody>
+          <a:bodyPr/>
+          <a:lstStyle/>
+          <a:p>
+            <a:fld id="{AA827EB0-AEEB-C744-BAD0-812E2F8A9F84}" type="slidenum">
+              <a:rPr lang="en-US" smtClean="0"/>
+              <a:t>6</a:t>
+            </a:fld>
+            <a:endParaRPr lang="en-US"/>
+          </a:p>
+        </p:txBody>
+      </p:sp>
+    </p:spTree>
+    <p:extLst>
+      <p:ext uri="{BB962C8B-B14F-4D97-AF65-F5344CB8AC3E}">
+        <p14:creationId xmlns:p14="http://schemas.microsoft.com/office/powerpoint/2010/main" val="145524140"/>
+      </p:ext>
+    </p:extLst>
+  </p:cSld>
+  <p:clrMapOvr>
+    <a:masterClrMapping/>
+  </p:clrMapOvr>
+</p:notes>
+</file>
+
+<file path=ppt/notesSlides/notesSlide7.xml><?xml version="1.0" encoding="utf-8"?>
 <p:notes xmlns:a="http://schemas.openxmlformats.org/drawingml/2006/main" xmlns:r="http://schemas.openxmlformats.org/officeDocument/2006/relationships" xmlns:p="http://schemas.openxmlformats.org/presentationml/2006/main">
   <p:cSld>
     <p:spTree>
@@ -4016,7 +4689,7 @@
           <p:nvPr/>
         </p:nvPicPr>
         <p:blipFill>
-          <a:blip r:embed="rId2">
+          <a:blip r:embed="rId3">
             <a:extLst>
               <a:ext uri="{28A0092B-C50C-407E-A947-70E740481C1C}">
                 <a14:useLocalDpi xmlns:a14="http://schemas.microsoft.com/office/drawing/2010/main" val="0"/>
@@ -4178,15 +4851,7 @@
                   <a:srgbClr val="26374B"/>
                 </a:solidFill>
               </a:rPr>
-              <a:t>June 9, </a:t>
-            </a:r>
-            <a:r>
-              <a:rPr lang="en-US" sz="1100" dirty="0" smtClean="0">
-                <a:solidFill>
-                  <a:srgbClr val="26374B"/>
-                </a:solidFill>
-              </a:rPr>
-              <a:t>2016. </a:t>
+              <a:t>June 9, 2016. </a:t>
             </a:r>
             <a:r>
               <a:rPr lang="de-DE" sz="1100" dirty="0">
@@ -4492,7 +5157,7 @@
           <p:nvPr/>
         </p:nvPicPr>
         <p:blipFill>
-          <a:blip r:embed="rId2">
+          <a:blip r:embed="rId3">
             <a:extLst>
               <a:ext uri="{28A0092B-C50C-407E-A947-70E740481C1C}">
                 <a14:useLocalDpi xmlns:a14="http://schemas.microsoft.com/office/drawing/2010/main" val="0"/>
@@ -4602,7 +5267,7 @@
           <p:nvPr/>
         </p:nvPicPr>
         <p:blipFill>
-          <a:blip r:embed="rId2">
+          <a:blip r:embed="rId3">
             <a:extLst>
               <a:ext uri="{28A0092B-C50C-407E-A947-70E740481C1C}">
                 <a14:useLocalDpi xmlns:a14="http://schemas.microsoft.com/office/drawing/2010/main" val="0"/>
@@ -4710,23 +5375,7 @@
                   <a:srgbClr val="26374B"/>
                 </a:solidFill>
               </a:rPr>
-              <a:t>June </a:t>
-            </a:r>
-            <a:r>
-              <a:rPr lang="en-US" sz="1100" dirty="0" smtClean="0">
-                <a:solidFill>
-                  <a:srgbClr val="26374B"/>
-                </a:solidFill>
-              </a:rPr>
-              <a:t>9, 2016</a:t>
-            </a:r>
-            <a:r>
-              <a:rPr lang="en-US" sz="1100" dirty="0" smtClean="0">
-                <a:solidFill>
-                  <a:srgbClr val="26374B"/>
-                </a:solidFill>
-              </a:rPr>
-              <a:t>. </a:t>
+              <a:t>June 9, 2016. </a:t>
             </a:r>
             <a:r>
               <a:rPr lang="en-US" sz="1100" dirty="0">
@@ -4839,7 +5488,7 @@
           <p:nvPr/>
         </p:nvPicPr>
         <p:blipFill>
-          <a:blip r:embed="rId2">
+          <a:blip r:embed="rId3">
             <a:extLst>
               <a:ext uri="{28A0092B-C50C-407E-A947-70E740481C1C}">
                 <a14:useLocalDpi xmlns:a14="http://schemas.microsoft.com/office/drawing/2010/main" val="0"/>
@@ -4923,15 +5572,7 @@
                   <a:srgbClr val="26374B"/>
                 </a:solidFill>
               </a:rPr>
-              <a:t>June 9, </a:t>
-            </a:r>
-            <a:r>
-              <a:rPr lang="en-US" sz="1100" dirty="0" smtClean="0">
-                <a:solidFill>
-                  <a:srgbClr val="26374B"/>
-                </a:solidFill>
-              </a:rPr>
-              <a:t>2016. </a:t>
+              <a:t>June 9, 2016. </a:t>
             </a:r>
             <a:r>
               <a:rPr lang="en-US" sz="1100" dirty="0">
@@ -5029,7 +5670,7 @@
           <p:nvPr/>
         </p:nvPicPr>
         <p:blipFill>
-          <a:blip r:embed="rId2">
+          <a:blip r:embed="rId3">
             <a:extLst>
               <a:ext uri="{28A0092B-C50C-407E-A947-70E740481C1C}">
                 <a14:useLocalDpi xmlns:a14="http://schemas.microsoft.com/office/drawing/2010/main" val="0"/>
@@ -5129,23 +5770,7 @@
                   <a:srgbClr val="26374B"/>
                 </a:solidFill>
               </a:rPr>
-              <a:t>June </a:t>
-            </a:r>
-            <a:r>
-              <a:rPr lang="en-US" sz="1100" dirty="0" smtClean="0">
-                <a:solidFill>
-                  <a:srgbClr val="26374B"/>
-                </a:solidFill>
-              </a:rPr>
-              <a:t>9, 2016</a:t>
-            </a:r>
-            <a:r>
-              <a:rPr lang="en-US" sz="1100" dirty="0" smtClean="0">
-                <a:solidFill>
-                  <a:srgbClr val="26374B"/>
-                </a:solidFill>
-              </a:rPr>
-              <a:t>. </a:t>
+              <a:t>June 9, 2016. </a:t>
             </a:r>
             <a:r>
               <a:rPr lang="de-DE" sz="1100" dirty="0">

</xml_diff>

<commit_message>
Final Slide Edits and PDF addition
</commit_message>
<xml_diff>
--- a/Presentations/Open Repositories 2016/Digital Stewardship/DigitalStewardship.pptx
+++ b/Presentations/Open Repositories 2016/Digital Stewardship/DigitalStewardship.pptx
@@ -7,6 +7,9 @@
   <p:notesMasterIdLst>
     <p:notesMasterId r:id="rId10"/>
   </p:notesMasterIdLst>
+  <p:handoutMasterIdLst>
+    <p:handoutMasterId r:id="rId11"/>
+  </p:handoutMasterIdLst>
   <p:sldIdLst>
     <p:sldId id="257" r:id="rId2"/>
     <p:sldId id="276" r:id="rId3"/>
@@ -133,6 +136,171 @@
 </p:presentation>
 </file>
 
+<file path=ppt/handoutMasters/handoutMaster1.xml><?xml version="1.0" encoding="utf-8"?>
+<p:handoutMaster xmlns:a="http://schemas.openxmlformats.org/drawingml/2006/main" xmlns:r="http://schemas.openxmlformats.org/officeDocument/2006/relationships" xmlns:p="http://schemas.openxmlformats.org/presentationml/2006/main">
+  <p:cSld>
+    <p:bg>
+      <p:bgRef idx="1001">
+        <a:schemeClr val="bg1"/>
+      </p:bgRef>
+    </p:bg>
+    <p:spTree>
+      <p:nvGrpSpPr>
+        <p:cNvPr id="1" name=""/>
+        <p:cNvGrpSpPr/>
+        <p:nvPr/>
+      </p:nvGrpSpPr>
+      <p:grpSpPr>
+        <a:xfrm>
+          <a:off x="0" y="0"/>
+          <a:ext cx="0" cy="0"/>
+          <a:chOff x="0" y="0"/>
+          <a:chExt cx="0" cy="0"/>
+        </a:xfrm>
+      </p:grpSpPr>
+      <p:sp>
+        <p:nvSpPr>
+          <p:cNvPr id="2" name="Header Placeholder 1"/>
+          <p:cNvSpPr>
+            <a:spLocks noGrp="1"/>
+          </p:cNvSpPr>
+          <p:nvPr>
+            <p:ph type="hdr" sz="quarter"/>
+          </p:nvPr>
+        </p:nvSpPr>
+        <p:spPr>
+          <a:xfrm>
+            <a:off x="0" y="0"/>
+            <a:ext cx="2971800" cy="458788"/>
+          </a:xfrm>
+          <a:prstGeom prst="rect">
+            <a:avLst/>
+          </a:prstGeom>
+        </p:spPr>
+        <p:txBody>
+          <a:bodyPr vert="horz" lIns="91440" tIns="45720" rIns="91440" bIns="45720" rtlCol="0"/>
+          <a:lstStyle>
+            <a:lvl1pPr algn="l">
+              <a:defRPr sz="1200"/>
+            </a:lvl1pPr>
+          </a:lstStyle>
+          <a:p>
+            <a:endParaRPr lang="en-US"/>
+          </a:p>
+        </p:txBody>
+      </p:sp>
+      <p:sp>
+        <p:nvSpPr>
+          <p:cNvPr id="3" name="Date Placeholder 2"/>
+          <p:cNvSpPr>
+            <a:spLocks noGrp="1"/>
+          </p:cNvSpPr>
+          <p:nvPr>
+            <p:ph type="dt" sz="quarter" idx="1"/>
+          </p:nvPr>
+        </p:nvSpPr>
+        <p:spPr>
+          <a:xfrm>
+            <a:off x="3884613" y="0"/>
+            <a:ext cx="2971800" cy="458788"/>
+          </a:xfrm>
+          <a:prstGeom prst="rect">
+            <a:avLst/>
+          </a:prstGeom>
+        </p:spPr>
+        <p:txBody>
+          <a:bodyPr vert="horz" lIns="91440" tIns="45720" rIns="91440" bIns="45720" rtlCol="0"/>
+          <a:lstStyle>
+            <a:lvl1pPr algn="r">
+              <a:defRPr sz="1200"/>
+            </a:lvl1pPr>
+          </a:lstStyle>
+          <a:p>
+            <a:fld id="{93B61DA9-B0D2-1340-A245-CAF24BC27783}" type="datetimeFigureOut">
+              <a:rPr lang="en-US" smtClean="0"/>
+              <a:t>6/10/16</a:t>
+            </a:fld>
+            <a:endParaRPr lang="en-US"/>
+          </a:p>
+        </p:txBody>
+      </p:sp>
+      <p:sp>
+        <p:nvSpPr>
+          <p:cNvPr id="4" name="Footer Placeholder 3"/>
+          <p:cNvSpPr>
+            <a:spLocks noGrp="1"/>
+          </p:cNvSpPr>
+          <p:nvPr>
+            <p:ph type="ftr" sz="quarter" idx="2"/>
+          </p:nvPr>
+        </p:nvSpPr>
+        <p:spPr>
+          <a:xfrm>
+            <a:off x="0" y="8685213"/>
+            <a:ext cx="2971800" cy="458787"/>
+          </a:xfrm>
+          <a:prstGeom prst="rect">
+            <a:avLst/>
+          </a:prstGeom>
+        </p:spPr>
+        <p:txBody>
+          <a:bodyPr vert="horz" lIns="91440" tIns="45720" rIns="91440" bIns="45720" rtlCol="0" anchor="b"/>
+          <a:lstStyle>
+            <a:lvl1pPr algn="l">
+              <a:defRPr sz="1200"/>
+            </a:lvl1pPr>
+          </a:lstStyle>
+          <a:p>
+            <a:endParaRPr lang="en-US"/>
+          </a:p>
+        </p:txBody>
+      </p:sp>
+      <p:sp>
+        <p:nvSpPr>
+          <p:cNvPr id="5" name="Slide Number Placeholder 4"/>
+          <p:cNvSpPr>
+            <a:spLocks noGrp="1"/>
+          </p:cNvSpPr>
+          <p:nvPr>
+            <p:ph type="sldNum" sz="quarter" idx="3"/>
+          </p:nvPr>
+        </p:nvSpPr>
+        <p:spPr>
+          <a:xfrm>
+            <a:off x="3884613" y="8685213"/>
+            <a:ext cx="2971800" cy="458787"/>
+          </a:xfrm>
+          <a:prstGeom prst="rect">
+            <a:avLst/>
+          </a:prstGeom>
+        </p:spPr>
+        <p:txBody>
+          <a:bodyPr vert="horz" lIns="91440" tIns="45720" rIns="91440" bIns="45720" rtlCol="0" anchor="b"/>
+          <a:lstStyle>
+            <a:lvl1pPr algn="r">
+              <a:defRPr sz="1200"/>
+            </a:lvl1pPr>
+          </a:lstStyle>
+          <a:p>
+            <a:fld id="{106C7BED-E706-574F-9DD1-841978BF7A61}" type="slidenum">
+              <a:rPr lang="en-US" smtClean="0"/>
+              <a:t>‹#›</a:t>
+            </a:fld>
+            <a:endParaRPr lang="en-US"/>
+          </a:p>
+        </p:txBody>
+      </p:sp>
+    </p:spTree>
+    <p:extLst>
+      <p:ext uri="{BB962C8B-B14F-4D97-AF65-F5344CB8AC3E}">
+        <p14:creationId xmlns:p14="http://schemas.microsoft.com/office/powerpoint/2010/main" val="1248936009"/>
+      </p:ext>
+    </p:extLst>
+  </p:cSld>
+  <p:clrMap bg1="lt1" tx1="dk1" bg2="lt2" tx2="dk2" accent1="accent1" accent2="accent2" accent3="accent3" accent4="accent4" accent5="accent5" accent6="accent6" hlink="hlink" folHlink="folHlink"/>
+</p:handoutMaster>
+</file>
+
 <file path=ppt/notesMasters/notesMaster1.xml><?xml version="1.0" encoding="utf-8"?>
 <p:notesMaster xmlns:a="http://schemas.openxmlformats.org/drawingml/2006/main" xmlns:r="http://schemas.openxmlformats.org/officeDocument/2006/relationships" xmlns:p="http://schemas.openxmlformats.org/presentationml/2006/main">
   <p:cSld>
@@ -768,7 +936,7 @@
           <a:p>
             <a:r>
               <a:rPr lang="en-US" dirty="0" smtClean="0"/>
-              <a:t>Using DCC’s illustration as a model, we can identify four basic stewardship and curation actions: plan, collect, describe, and maintain.</a:t>
+              <a:t>Using the DCC’s illustration as a model, we can identify four basic stewardship and curation actions: plan, collect, describe, and maintain.</a:t>
             </a:r>
           </a:p>
           <a:p>
@@ -786,7 +954,7 @@
           <a:p>
             <a:r>
               <a:rPr lang="en-US" dirty="0" smtClean="0"/>
-              <a:t>Whether you create or collect digital materials, you should do so methodically, creating or collecting metadata as you gather your materials.</a:t>
+              <a:t>Whether you create or collect digital materials, you should do so methodically, organizing your materials as you gather them.</a:t>
             </a:r>
           </a:p>
           <a:p>
@@ -795,7 +963,7 @@
           <a:p>
             <a:r>
               <a:rPr lang="en-US" dirty="0" smtClean="0"/>
-              <a:t>You should create and store as much metadata as possible about your digital materials, including descriptive, administrative, technical, and preservation metadata, using appropriate standards, and applying metadata consistently, if possible. Make sure your digital materials are clearly identified, and the system you use to organize those materials can be used by others.</a:t>
+              <a:t>You should create and store as much metadata as possible about your digital materials, including descriptive, administrative, technical, and preservation metadata. </a:t>
             </a:r>
           </a:p>
           <a:p>
@@ -910,16 +1078,7 @@
           <a:p>
             <a:r>
               <a:rPr lang="en-US" dirty="0" smtClean="0"/>
-              <a:t>In our library we encounter a lot of university staff and faculty with digital materials they need to store, use, and share. They often come to us with a problem: they have been struggling to manage some sort of digital project, from research data to departmental photography. The materials are precariously stored on an individual’s hard drive, they may have had a close call with losing materials, or they may have experienced staff turnover and want to make sure future staff changes don’t disrupt their project or digital materials.</a:t>
-            </a:r>
-          </a:p>
-          <a:p>
-            <a:endParaRPr lang="en-US" dirty="0" smtClean="0"/>
-          </a:p>
-          <a:p>
-            <a:r>
-              <a:rPr lang="en-US" dirty="0" smtClean="0"/>
-              <a:t>Our working relationships with faculty, researchers, and project teams start because we offer them a solution to their problems: secure repository storage for their digital materials. As we build this relationship, we discuss all the benefits of using a repository to store and share their materials. The advantages usually outweigh the disadvantages and we work together to ingest their files and setup a workflow for their research group, office, or department. </a:t>
+              <a:t>In our library we encounter a lot of university staff and faculty with digital materials they need to store, use, and share. Our working relationships with faculty, researchers, and project teams start because we offer them a solution to their problems: secure repository storage for their digital materials. They often come to us with a problem: they have been struggling to manage some sort of digital project, from research data to departmental photography. The materials are precariously stored on an individual’s hard drive, they may have had a close call with losing materials, or they want to make sure future department changes don’t disrupt their project or digital materials.</a:t>
             </a:r>
           </a:p>
           <a:p>
@@ -1083,17 +1242,9 @@
             </a:r>
           </a:p>
           <a:p>
-            <a:pPr marL="0" indent="0">
-              <a:buFont typeface="Arial" charset="0"/>
-              <a:buNone/>
-            </a:pPr>
             <a:endParaRPr lang="en-US" dirty="0" smtClean="0"/>
           </a:p>
           <a:p>
-            <a:pPr marL="0" indent="0">
-              <a:buFont typeface="Arial" charset="0"/>
-              <a:buNone/>
-            </a:pPr>
             <a:r>
               <a:rPr lang="en-US" dirty="0" smtClean="0"/>
               <a:t>In these conversations we are using the repository and its workflows as a frame for digital stewardship concepts that otherwise seem tedious or overwhelming. The benefit of this is that we can encourage repository users to be stewards of their own digital materials without ever saying the words digital stewardship or digital curation.</a:t>
@@ -1184,7 +1335,7 @@
           <a:p>
             <a:r>
               <a:rPr lang="en-US" sz="1200" dirty="0" smtClean="0"/>
-              <a:t>That’s not to say that we as repository staff have all the answers about digital stewardship; in fact, many of us are learning about best practices on the fly. Our library’s digital scholarship and repository staff rarely set out with a checklist of digital stewardship principles to discuss with our users. Rather, we take advantage of the opportunity we have when helping repository users to teach them about digital stewardship, while also attempting to make their lives easier.</a:t>
+              <a:t>That’s not to say that we as repository staff have all the answers about digital stewardship; in fact, many of us are learning about best practices on the fly. Our library’s digital scholarship and repository staff rarely set out with a checklist of digital stewardship principles to discuss with our users. </a:t>
             </a:r>
           </a:p>
           <a:p>
@@ -1202,7 +1353,16 @@
           <a:p>
             <a:r>
               <a:rPr lang="en-US" sz="1200" dirty="0" smtClean="0"/>
-              <a:t>I encourage you all to think about the relationships you have with stewards of digital materials, to listen to their experiences, and encourage them to insert digital stewardship best practices into their own work. Thank you.</a:t>
+              <a:t>I encourage you all to think about the relationships you have with stewards of digital materials, to listen to their experiences, and encourage them to insert digital stewardship best practices into their own work.</a:t>
+            </a:r>
+          </a:p>
+          <a:p>
+            <a:endParaRPr lang="en-US" sz="1200" dirty="0" smtClean="0"/>
+          </a:p>
+          <a:p>
+            <a:r>
+              <a:rPr lang="en-US" sz="1200" dirty="0" smtClean="0"/>
+              <a:t>Thank you.</a:t>
             </a:r>
             <a:endParaRPr lang="en-US" sz="1200" dirty="0"/>
           </a:p>
@@ -1288,10 +1448,6 @@
           <a:bodyPr/>
           <a:lstStyle/>
           <a:p>
-            <a:r>
-              <a:rPr lang="en-US" dirty="0" smtClean="0"/>
-              <a:t>Promotional Slide</a:t>
-            </a:r>
             <a:endParaRPr lang="en-US" dirty="0"/>
           </a:p>
         </p:txBody>
@@ -1323,6 +1479,90 @@
     <p:extLst>
       <p:ext uri="{BB962C8B-B14F-4D97-AF65-F5344CB8AC3E}">
         <p14:creationId xmlns:p14="http://schemas.microsoft.com/office/powerpoint/2010/main" val="3880072932"/>
+      </p:ext>
+    </p:extLst>
+  </p:cSld>
+  <p:clrMapOvr>
+    <a:masterClrMapping/>
+  </p:clrMapOvr>
+</p:notes>
+</file>
+
+<file path=ppt/notesSlides/notesSlide8.xml><?xml version="1.0" encoding="utf-8"?>
+<p:notes xmlns:a="http://schemas.openxmlformats.org/drawingml/2006/main" xmlns:r="http://schemas.openxmlformats.org/officeDocument/2006/relationships" xmlns:p="http://schemas.openxmlformats.org/presentationml/2006/main">
+  <p:cSld>
+    <p:spTree>
+      <p:nvGrpSpPr>
+        <p:cNvPr id="1" name=""/>
+        <p:cNvGrpSpPr/>
+        <p:nvPr/>
+      </p:nvGrpSpPr>
+      <p:grpSpPr>
+        <a:xfrm>
+          <a:off x="0" y="0"/>
+          <a:ext cx="0" cy="0"/>
+          <a:chOff x="0" y="0"/>
+          <a:chExt cx="0" cy="0"/>
+        </a:xfrm>
+      </p:grpSpPr>
+      <p:sp>
+        <p:nvSpPr>
+          <p:cNvPr id="2" name="Slide Image Placeholder 1"/>
+          <p:cNvSpPr>
+            <a:spLocks noGrp="1" noRot="1" noChangeAspect="1"/>
+          </p:cNvSpPr>
+          <p:nvPr>
+            <p:ph type="sldImg"/>
+          </p:nvPr>
+        </p:nvSpPr>
+        <p:spPr/>
+      </p:sp>
+      <p:sp>
+        <p:nvSpPr>
+          <p:cNvPr id="3" name="Notes Placeholder 2"/>
+          <p:cNvSpPr>
+            <a:spLocks noGrp="1"/>
+          </p:cNvSpPr>
+          <p:nvPr>
+            <p:ph type="body" idx="1"/>
+          </p:nvPr>
+        </p:nvSpPr>
+        <p:spPr/>
+        <p:txBody>
+          <a:bodyPr/>
+          <a:lstStyle/>
+          <a:p>
+            <a:endParaRPr lang="en-US"/>
+          </a:p>
+        </p:txBody>
+      </p:sp>
+      <p:sp>
+        <p:nvSpPr>
+          <p:cNvPr id="4" name="Slide Number Placeholder 3"/>
+          <p:cNvSpPr>
+            <a:spLocks noGrp="1"/>
+          </p:cNvSpPr>
+          <p:nvPr>
+            <p:ph type="sldNum" sz="quarter" idx="10"/>
+          </p:nvPr>
+        </p:nvSpPr>
+        <p:spPr/>
+        <p:txBody>
+          <a:bodyPr/>
+          <a:lstStyle/>
+          <a:p>
+            <a:fld id="{AA827EB0-AEEB-C744-BAD0-812E2F8A9F84}" type="slidenum">
+              <a:rPr lang="en-US" smtClean="0"/>
+              <a:t>8</a:t>
+            </a:fld>
+            <a:endParaRPr lang="en-US"/>
+          </a:p>
+        </p:txBody>
+      </p:sp>
+    </p:spTree>
+    <p:extLst>
+      <p:ext uri="{BB962C8B-B14F-4D97-AF65-F5344CB8AC3E}">
+        <p14:creationId xmlns:p14="http://schemas.microsoft.com/office/powerpoint/2010/main" val="1033849992"/>
       </p:ext>
     </p:extLst>
   </p:cSld>
@@ -7862,4 +8102,265 @@
   </a:objectDefaults>
   <a:extraClrSchemeLst/>
 </a:theme>
+</file>
+
+<file path=ppt/theme/theme3.xml><?xml version="1.0" encoding="utf-8"?>
+<a:theme xmlns:a="http://schemas.openxmlformats.org/drawingml/2006/main" name="Office Theme">
+  <a:themeElements>
+    <a:clrScheme name="Office">
+      <a:dk1>
+        <a:sysClr val="windowText" lastClr="000000"/>
+      </a:dk1>
+      <a:lt1>
+        <a:sysClr val="window" lastClr="FFFFFF"/>
+      </a:lt1>
+      <a:dk2>
+        <a:srgbClr val="44546A"/>
+      </a:dk2>
+      <a:lt2>
+        <a:srgbClr val="E7E6E6"/>
+      </a:lt2>
+      <a:accent1>
+        <a:srgbClr val="5B9BD5"/>
+      </a:accent1>
+      <a:accent2>
+        <a:srgbClr val="ED7D31"/>
+      </a:accent2>
+      <a:accent3>
+        <a:srgbClr val="A5A5A5"/>
+      </a:accent3>
+      <a:accent4>
+        <a:srgbClr val="FFC000"/>
+      </a:accent4>
+      <a:accent5>
+        <a:srgbClr val="4472C4"/>
+      </a:accent5>
+      <a:accent6>
+        <a:srgbClr val="70AD47"/>
+      </a:accent6>
+      <a:hlink>
+        <a:srgbClr val="0563C1"/>
+      </a:hlink>
+      <a:folHlink>
+        <a:srgbClr val="954F72"/>
+      </a:folHlink>
+    </a:clrScheme>
+    <a:fontScheme name="Office">
+      <a:majorFont>
+        <a:latin typeface="Calibri Light" panose="020F0302020204030204"/>
+        <a:ea typeface=""/>
+        <a:cs typeface=""/>
+        <a:font script="Jpan" typeface="Yu Gothic Light"/>
+        <a:font script="Hang" typeface="맑은 고딕"/>
+        <a:font script="Hans" typeface="DengXian Light"/>
+        <a:font script="Hant" typeface="新細明體"/>
+        <a:font script="Arab" typeface="Times New Roman"/>
+        <a:font script="Hebr" typeface="Times New Roman"/>
+        <a:font script="Thai" typeface="Angsana New"/>
+        <a:font script="Ethi" typeface="Nyala"/>
+        <a:font script="Beng" typeface="Vrinda"/>
+        <a:font script="Gujr" typeface="Shruti"/>
+        <a:font script="Khmr" typeface="MoolBoran"/>
+        <a:font script="Knda" typeface="Tunga"/>
+        <a:font script="Guru" typeface="Raavi"/>
+        <a:font script="Cans" typeface="Euphemia"/>
+        <a:font script="Cher" typeface="Plantagenet Cherokee"/>
+        <a:font script="Yiii" typeface="Microsoft Yi Baiti"/>
+        <a:font script="Tibt" typeface="Microsoft Himalaya"/>
+        <a:font script="Thaa" typeface="MV Boli"/>
+        <a:font script="Deva" typeface="Mangal"/>
+        <a:font script="Telu" typeface="Gautami"/>
+        <a:font script="Taml" typeface="Latha"/>
+        <a:font script="Syrc" typeface="Estrangelo Edessa"/>
+        <a:font script="Orya" typeface="Kalinga"/>
+        <a:font script="Mlym" typeface="Kartika"/>
+        <a:font script="Laoo" typeface="DokChampa"/>
+        <a:font script="Sinh" typeface="Iskoola Pota"/>
+        <a:font script="Mong" typeface="Mongolian Baiti"/>
+        <a:font script="Viet" typeface="Times New Roman"/>
+        <a:font script="Uigh" typeface="Microsoft Uighur"/>
+        <a:font script="Geor" typeface="Sylfaen"/>
+      </a:majorFont>
+      <a:minorFont>
+        <a:latin typeface="Calibri" panose="020F0502020204030204"/>
+        <a:ea typeface=""/>
+        <a:cs typeface=""/>
+        <a:font script="Jpan" typeface="Yu Gothic"/>
+        <a:font script="Hang" typeface="맑은 고딕"/>
+        <a:font script="Hans" typeface="DengXian"/>
+        <a:font script="Hant" typeface="新細明體"/>
+        <a:font script="Arab" typeface="Arial"/>
+        <a:font script="Hebr" typeface="Arial"/>
+        <a:font script="Thai" typeface="Cordia New"/>
+        <a:font script="Ethi" typeface="Nyala"/>
+        <a:font script="Beng" typeface="Vrinda"/>
+        <a:font script="Gujr" typeface="Shruti"/>
+        <a:font script="Khmr" typeface="DaunPenh"/>
+        <a:font script="Knda" typeface="Tunga"/>
+        <a:font script="Guru" typeface="Raavi"/>
+        <a:font script="Cans" typeface="Euphemia"/>
+        <a:font script="Cher" typeface="Plantagenet Cherokee"/>
+        <a:font script="Yiii" typeface="Microsoft Yi Baiti"/>
+        <a:font script="Tibt" typeface="Microsoft Himalaya"/>
+        <a:font script="Thaa" typeface="MV Boli"/>
+        <a:font script="Deva" typeface="Mangal"/>
+        <a:font script="Telu" typeface="Gautami"/>
+        <a:font script="Taml" typeface="Latha"/>
+        <a:font script="Syrc" typeface="Estrangelo Edessa"/>
+        <a:font script="Orya" typeface="Kalinga"/>
+        <a:font script="Mlym" typeface="Kartika"/>
+        <a:font script="Laoo" typeface="DokChampa"/>
+        <a:font script="Sinh" typeface="Iskoola Pota"/>
+        <a:font script="Mong" typeface="Mongolian Baiti"/>
+        <a:font script="Viet" typeface="Arial"/>
+        <a:font script="Uigh" typeface="Microsoft Uighur"/>
+        <a:font script="Geor" typeface="Sylfaen"/>
+      </a:minorFont>
+    </a:fontScheme>
+    <a:fmtScheme name="Office">
+      <a:fillStyleLst>
+        <a:solidFill>
+          <a:schemeClr val="phClr"/>
+        </a:solidFill>
+        <a:gradFill rotWithShape="1">
+          <a:gsLst>
+            <a:gs pos="0">
+              <a:schemeClr val="phClr">
+                <a:lumMod val="110000"/>
+                <a:satMod val="105000"/>
+                <a:tint val="67000"/>
+              </a:schemeClr>
+            </a:gs>
+            <a:gs pos="50000">
+              <a:schemeClr val="phClr">
+                <a:lumMod val="105000"/>
+                <a:satMod val="103000"/>
+                <a:tint val="73000"/>
+              </a:schemeClr>
+            </a:gs>
+            <a:gs pos="100000">
+              <a:schemeClr val="phClr">
+                <a:lumMod val="105000"/>
+                <a:satMod val="109000"/>
+                <a:tint val="81000"/>
+              </a:schemeClr>
+            </a:gs>
+          </a:gsLst>
+          <a:lin ang="5400000" scaled="0"/>
+        </a:gradFill>
+        <a:gradFill rotWithShape="1">
+          <a:gsLst>
+            <a:gs pos="0">
+              <a:schemeClr val="phClr">
+                <a:satMod val="103000"/>
+                <a:lumMod val="102000"/>
+                <a:tint val="94000"/>
+              </a:schemeClr>
+            </a:gs>
+            <a:gs pos="50000">
+              <a:schemeClr val="phClr">
+                <a:satMod val="110000"/>
+                <a:lumMod val="100000"/>
+                <a:shade val="100000"/>
+              </a:schemeClr>
+            </a:gs>
+            <a:gs pos="100000">
+              <a:schemeClr val="phClr">
+                <a:lumMod val="99000"/>
+                <a:satMod val="120000"/>
+                <a:shade val="78000"/>
+              </a:schemeClr>
+            </a:gs>
+          </a:gsLst>
+          <a:lin ang="5400000" scaled="0"/>
+        </a:gradFill>
+      </a:fillStyleLst>
+      <a:lnStyleLst>
+        <a:ln w="6350" cap="flat" cmpd="sng" algn="ctr">
+          <a:solidFill>
+            <a:schemeClr val="phClr"/>
+          </a:solidFill>
+          <a:prstDash val="solid"/>
+          <a:miter lim="800000"/>
+        </a:ln>
+        <a:ln w="12700" cap="flat" cmpd="sng" algn="ctr">
+          <a:solidFill>
+            <a:schemeClr val="phClr"/>
+          </a:solidFill>
+          <a:prstDash val="solid"/>
+          <a:miter lim="800000"/>
+        </a:ln>
+        <a:ln w="19050" cap="flat" cmpd="sng" algn="ctr">
+          <a:solidFill>
+            <a:schemeClr val="phClr"/>
+          </a:solidFill>
+          <a:prstDash val="solid"/>
+          <a:miter lim="800000"/>
+        </a:ln>
+      </a:lnStyleLst>
+      <a:effectStyleLst>
+        <a:effectStyle>
+          <a:effectLst/>
+        </a:effectStyle>
+        <a:effectStyle>
+          <a:effectLst/>
+        </a:effectStyle>
+        <a:effectStyle>
+          <a:effectLst>
+            <a:outerShdw blurRad="57150" dist="19050" dir="5400000" algn="ctr" rotWithShape="0">
+              <a:srgbClr val="000000">
+                <a:alpha val="63000"/>
+              </a:srgbClr>
+            </a:outerShdw>
+          </a:effectLst>
+        </a:effectStyle>
+      </a:effectStyleLst>
+      <a:bgFillStyleLst>
+        <a:solidFill>
+          <a:schemeClr val="phClr"/>
+        </a:solidFill>
+        <a:solidFill>
+          <a:schemeClr val="phClr">
+            <a:tint val="95000"/>
+            <a:satMod val="170000"/>
+          </a:schemeClr>
+        </a:solidFill>
+        <a:gradFill rotWithShape="1">
+          <a:gsLst>
+            <a:gs pos="0">
+              <a:schemeClr val="phClr">
+                <a:tint val="93000"/>
+                <a:satMod val="150000"/>
+                <a:shade val="98000"/>
+                <a:lumMod val="102000"/>
+              </a:schemeClr>
+            </a:gs>
+            <a:gs pos="50000">
+              <a:schemeClr val="phClr">
+                <a:tint val="98000"/>
+                <a:satMod val="130000"/>
+                <a:shade val="90000"/>
+                <a:lumMod val="103000"/>
+              </a:schemeClr>
+            </a:gs>
+            <a:gs pos="100000">
+              <a:schemeClr val="phClr">
+                <a:shade val="63000"/>
+                <a:satMod val="120000"/>
+              </a:schemeClr>
+            </a:gs>
+          </a:gsLst>
+          <a:lin ang="5400000" scaled="0"/>
+        </a:gradFill>
+      </a:bgFillStyleLst>
+    </a:fmtScheme>
+  </a:themeElements>
+  <a:objectDefaults/>
+  <a:extraClrSchemeLst/>
+  <a:extLst>
+    <a:ext uri="{05A4C25C-085E-4340-85A3-A5531E510DB2}">
+      <thm15:themeFamily xmlns:thm15="http://schemas.microsoft.com/office/thememl/2012/main" name="Office Theme" id="{62F939B6-93AF-4DB8-9C6B-D6C7DFDC589F}" vid="{4A3C46E8-61CC-4603-A589-7422A47A8E4A}"/>
+    </a:ext>
+  </a:extLst>
+</a:theme>
 </file>
</xml_diff>